<commit_message>
vault backup: 2024-04-22 12:18:01
</commit_message>
<xml_diff>
--- a/git-pres.pptx
+++ b/git-pres.pptx
@@ -7,6 +7,26 @@
   <p:sldIdLst>
     <p:sldId id="256" r:id="rId2"/>
     <p:sldId id="257" r:id="rId3"/>
+    <p:sldId id="258" r:id="rId4"/>
+    <p:sldId id="259" r:id="rId5"/>
+    <p:sldId id="260" r:id="rId6"/>
+    <p:sldId id="261" r:id="rId7"/>
+    <p:sldId id="262" r:id="rId8"/>
+    <p:sldId id="263" r:id="rId9"/>
+    <p:sldId id="264" r:id="rId10"/>
+    <p:sldId id="265" r:id="rId11"/>
+    <p:sldId id="266" r:id="rId12"/>
+    <p:sldId id="267" r:id="rId13"/>
+    <p:sldId id="268" r:id="rId14"/>
+    <p:sldId id="269" r:id="rId15"/>
+    <p:sldId id="270" r:id="rId16"/>
+    <p:sldId id="271" r:id="rId17"/>
+    <p:sldId id="272" r:id="rId18"/>
+    <p:sldId id="273" r:id="rId19"/>
+    <p:sldId id="274" r:id="rId20"/>
+    <p:sldId id="275" r:id="rId21"/>
+    <p:sldId id="276" r:id="rId22"/>
+    <p:sldId id="277" r:id="rId23"/>
   </p:sldIdLst>
   <p:sldSz cx="9144000" cy="5143500" type="screen16x9"/>
   <p:notesSz cx="6858000" cy="9144000"/>
@@ -3098,6 +3118,115 @@
             <a:spLocks noGrp="1"/>
           </p:cNvSpPr>
           <p:nvPr>
+            <p:ph type="ctrTitle"/>
+          </p:nvPr>
+        </p:nvSpPr>
+        <p:spPr>
+          <a:xfrm>
+            <a:off x="685800" y="1597819"/>
+            <a:ext cx="7772400" cy="1102519"/>
+          </a:xfrm>
+        </p:spPr>
+        <p:txBody>
+          <a:bodyPr/>
+          <a:lstStyle/>
+          <a:p>
+            <a:pPr lvl="0" indent="0" marL="0">
+              <a:buNone/>
+            </a:pPr>
+            <a:r>
+              <a:rPr/>
+              <a:t>Git</a:t>
+            </a:r>
+          </a:p>
+        </p:txBody>
+      </p:sp>
+      <p:sp>
+        <p:nvSpPr>
+          <p:cNvPr id="3" name="Subtitle 2"/>
+          <p:cNvSpPr>
+            <a:spLocks noGrp="1"/>
+          </p:cNvSpPr>
+          <p:nvPr>
+            <p:ph idx="1" type="subTitle"/>
+          </p:nvPr>
+        </p:nvSpPr>
+        <p:spPr>
+          <a:xfrm>
+            <a:off x="1371600" y="2914650"/>
+            <a:ext cx="6400800" cy="1314450"/>
+          </a:xfrm>
+        </p:spPr>
+        <p:txBody>
+          <a:bodyPr/>
+          <a:lstStyle/>
+          <a:p>
+            <a:pPr lvl="0" indent="0" marL="0">
+              <a:buNone/>
+            </a:pPr>
+            <a:br/>
+            <a:br/>
+            <a:r>
+              <a:rPr/>
+              <a:t>Drew Helgerson</a:t>
+            </a:r>
+          </a:p>
+        </p:txBody>
+      </p:sp>
+      <p:sp>
+        <p:nvSpPr>
+          <p:cNvPr id="4" name="Date Placeholder 3"/>
+          <p:cNvSpPr>
+            <a:spLocks noGrp="1"/>
+          </p:cNvSpPr>
+          <p:nvPr>
+            <p:ph idx="10" sz="half" type="dt"/>
+          </p:nvPr>
+        </p:nvSpPr>
+        <p:spPr/>
+        <p:txBody>
+          <a:bodyPr/>
+          <a:lstStyle/>
+          <a:p>
+            <a:pPr lvl="0" indent="0" marL="0">
+              <a:buNone/>
+            </a:pPr>
+            <a:r>
+              <a:rPr/>
+              <a:t>Apr. 22, 2024</a:t>
+            </a:r>
+          </a:p>
+        </p:txBody>
+      </p:sp>
+    </p:spTree>
+  </p:cSld>
+</p:sld>
+</file>
+
+<file path=ppt/slides/slide10.xml><?xml version="1.0" encoding="utf-8"?>
+<p:sld xmlns:a="http://schemas.openxmlformats.org/drawingml/2006/main" xmlns:r="http://schemas.openxmlformats.org/officeDocument/2006/relationships" xmlns:p="http://schemas.openxmlformats.org/presentationml/2006/main">
+  <p:cSld>
+    <p:spTree>
+      <p:nvGrpSpPr>
+        <p:cNvPr id="1" name=""/>
+        <p:cNvGrpSpPr/>
+        <p:nvPr/>
+      </p:nvGrpSpPr>
+      <p:grpSpPr>
+        <a:xfrm>
+          <a:off x="0" y="0"/>
+          <a:ext cx="0" cy="0"/>
+          <a:chOff x="0" y="0"/>
+          <a:chExt cx="0" cy="0"/>
+        </a:xfrm>
+      </p:grpSpPr>
+      <p:sp>
+        <p:nvSpPr>
+          <p:cNvPr id="2" name="Title 1"/>
+          <p:cNvSpPr>
+            <a:spLocks noGrp="1"/>
+          </p:cNvSpPr>
+          <p:nvPr>
             <p:ph type="title"/>
           </p:nvPr>
         </p:nvSpPr>
@@ -3111,7 +3240,806 @@
             </a:pPr>
             <a:r>
               <a:rPr/>
-              <a:t># What is Git/GitHub</a:t>
+              <a:t>Remote</a:t>
+            </a:r>
+          </a:p>
+        </p:txBody>
+      </p:sp>
+      <p:sp>
+        <p:nvSpPr>
+          <p:cNvPr id="3" name="Content Placeholder 2"/>
+          <p:cNvSpPr>
+            <a:spLocks noGrp="1"/>
+          </p:cNvSpPr>
+          <p:nvPr>
+            <p:ph idx="1"/>
+          </p:nvPr>
+        </p:nvSpPr>
+        <p:spPr/>
+        <p:txBody>
+          <a:bodyPr/>
+          <a:lstStyle/>
+          <a:p>
+            <a:pPr lvl="0" indent="0" marL="0">
+              <a:buNone/>
+            </a:pPr>
+            <a:r>
+              <a:rPr/>
+              <a:t>now push your Repo to a remote - Create a Repo on your desired remote(GitHub) - </a:t>
+            </a:r>
+            <a:r>
+              <a:rPr>
+                <a:latin typeface="Courier"/>
+              </a:rPr>
+              <a:t>git add remote origin &lt;remote repo&gt;.git</a:t>
+            </a:r>
+            <a:r>
+              <a:rPr/>
+              <a:t> - now to sync your local repo with the remote repo do: </a:t>
+            </a:r>
+            <a:r>
+              <a:rPr>
+                <a:latin typeface="Courier"/>
+              </a:rPr>
+              <a:t>git pull &amp;&amp; git push</a:t>
+            </a:r>
+          </a:p>
+        </p:txBody>
+      </p:sp>
+    </p:spTree>
+  </p:cSld>
+</p:sld>
+</file>
+
+<file path=ppt/slides/slide11.xml><?xml version="1.0" encoding="utf-8"?>
+<p:sld xmlns:a="http://schemas.openxmlformats.org/drawingml/2006/main" xmlns:r="http://schemas.openxmlformats.org/officeDocument/2006/relationships" xmlns:p="http://schemas.openxmlformats.org/presentationml/2006/main">
+  <p:cSld>
+    <p:spTree>
+      <p:nvGrpSpPr>
+        <p:cNvPr id="1" name=""/>
+        <p:cNvGrpSpPr/>
+        <p:nvPr/>
+      </p:nvGrpSpPr>
+      <p:grpSpPr>
+        <a:xfrm>
+          <a:off x="0" y="0"/>
+          <a:ext cx="0" cy="0"/>
+          <a:chOff x="0" y="0"/>
+          <a:chExt cx="0" cy="0"/>
+        </a:xfrm>
+      </p:grpSpPr>
+      <p:sp>
+        <p:nvSpPr>
+          <p:cNvPr id="2" name="Title 1"/>
+          <p:cNvSpPr>
+            <a:spLocks noGrp="1"/>
+          </p:cNvSpPr>
+          <p:nvPr>
+            <p:ph type="title"/>
+          </p:nvPr>
+        </p:nvSpPr>
+        <p:spPr/>
+        <p:txBody>
+          <a:bodyPr/>
+          <a:lstStyle/>
+          <a:p>
+            <a:pPr lvl="0" indent="0" marL="0">
+              <a:buNone/>
+            </a:pPr>
+            <a:r>
+              <a:rPr/>
+              <a:t>Commits</a:t>
+            </a:r>
+          </a:p>
+        </p:txBody>
+      </p:sp>
+      <p:sp>
+        <p:nvSpPr>
+          <p:cNvPr id="3" name="Content Placeholder 2"/>
+          <p:cNvSpPr>
+            <a:spLocks noGrp="1"/>
+          </p:cNvSpPr>
+          <p:nvPr>
+            <p:ph idx="1"/>
+          </p:nvPr>
+        </p:nvSpPr>
+        <p:spPr/>
+        <p:txBody>
+          <a:bodyPr/>
+          <a:lstStyle/>
+          <a:p>
+            <a:pPr lvl="0"/>
+            <a:r>
+              <a:rPr/>
+              <a:t>the backbone of git</a:t>
+            </a:r>
+          </a:p>
+          <a:p>
+            <a:pPr lvl="0"/>
+            <a:r>
+              <a:rPr/>
+              <a:t>creates a snapshot in time of your project and hashes it for computation</a:t>
+            </a:r>
+          </a:p>
+          <a:p>
+            <a:pPr lvl="0"/>
+            <a:r>
+              <a:rPr b="1"/>
+              <a:t>after any meaningful change, you should ‘commit’ your changes</a:t>
+            </a:r>
+          </a:p>
+        </p:txBody>
+      </p:sp>
+    </p:spTree>
+  </p:cSld>
+</p:sld>
+</file>
+
+<file path=ppt/slides/slide12.xml><?xml version="1.0" encoding="utf-8"?>
+<p:sld xmlns:a="http://schemas.openxmlformats.org/drawingml/2006/main" xmlns:r="http://schemas.openxmlformats.org/officeDocument/2006/relationships" xmlns:p="http://schemas.openxmlformats.org/presentationml/2006/main">
+  <p:cSld>
+    <p:spTree>
+      <p:nvGrpSpPr>
+        <p:cNvPr id="1" name=""/>
+        <p:cNvGrpSpPr/>
+        <p:nvPr/>
+      </p:nvGrpSpPr>
+      <p:grpSpPr>
+        <a:xfrm>
+          <a:off x="0" y="0"/>
+          <a:ext cx="0" cy="0"/>
+          <a:chOff x="0" y="0"/>
+          <a:chExt cx="0" cy="0"/>
+        </a:xfrm>
+      </p:grpSpPr>
+      <p:sp>
+        <p:nvSpPr>
+          <p:cNvPr id="2" name="Title 1"/>
+          <p:cNvSpPr>
+            <a:spLocks noGrp="1"/>
+          </p:cNvSpPr>
+          <p:nvPr>
+            <p:ph type="title"/>
+          </p:nvPr>
+        </p:nvSpPr>
+        <p:spPr/>
+        <p:txBody>
+          <a:bodyPr/>
+          <a:lstStyle/>
+          <a:p>
+            <a:pPr lvl="0" indent="0" marL="0">
+              <a:buNone/>
+            </a:pPr>
+            <a:r>
+              <a:rPr/>
+              <a:t>Branches</a:t>
+            </a:r>
+          </a:p>
+        </p:txBody>
+      </p:sp>
+      <p:sp>
+        <p:nvSpPr>
+          <p:cNvPr id="3" name="Content Placeholder 2"/>
+          <p:cNvSpPr>
+            <a:spLocks noGrp="1"/>
+          </p:cNvSpPr>
+          <p:nvPr>
+            <p:ph idx="1"/>
+          </p:nvPr>
+        </p:nvSpPr>
+        <p:spPr/>
+        <p:txBody>
+          <a:bodyPr/>
+          <a:lstStyle/>
+          <a:p>
+            <a:pPr lvl="0"/>
+            <a:r>
+              <a:rPr/>
+              <a:t>many people working on a project</a:t>
+            </a:r>
+          </a:p>
+          <a:p>
+            <a:pPr lvl="0"/>
+            <a:r>
+              <a:rPr/>
+              <a:t>issues arise when everybody has their hands on a single file</a:t>
+            </a:r>
+          </a:p>
+          <a:p>
+            <a:pPr lvl="0"/>
+            <a:r>
+              <a:rPr/>
+              <a:t>changes more than a few lines of code should be done in branches</a:t>
+            </a:r>
+          </a:p>
+          <a:p>
+            <a:pPr lvl="0"/>
+            <a:r>
+              <a:rPr/>
+              <a:t>as simple as </a:t>
+            </a:r>
+            <a:r>
+              <a:rPr>
+                <a:latin typeface="Courier"/>
+              </a:rPr>
+              <a:t>git switch -c &lt;branch-name&gt;</a:t>
+            </a:r>
+          </a:p>
+          <a:p>
+            <a:pPr lvl="0"/>
+            <a:r>
+              <a:rPr/>
+              <a:t>make your changes</a:t>
+            </a:r>
+          </a:p>
+        </p:txBody>
+      </p:sp>
+    </p:spTree>
+  </p:cSld>
+</p:sld>
+</file>
+
+<file path=ppt/slides/slide13.xml><?xml version="1.0" encoding="utf-8"?>
+<p:sld xmlns:a="http://schemas.openxmlformats.org/drawingml/2006/main" xmlns:r="http://schemas.openxmlformats.org/officeDocument/2006/relationships" xmlns:p="http://schemas.openxmlformats.org/presentationml/2006/main">
+  <p:cSld>
+    <p:spTree>
+      <p:nvGrpSpPr>
+        <p:cNvPr id="1" name=""/>
+        <p:cNvGrpSpPr/>
+        <p:nvPr/>
+      </p:nvGrpSpPr>
+      <p:grpSpPr>
+        <a:xfrm>
+          <a:off x="0" y="0"/>
+          <a:ext cx="0" cy="0"/>
+          <a:chOff x="0" y="0"/>
+          <a:chExt cx="0" cy="0"/>
+        </a:xfrm>
+      </p:grpSpPr>
+      <p:sp>
+        <p:nvSpPr>
+          <p:cNvPr id="2" name="Title 1"/>
+          <p:cNvSpPr>
+            <a:spLocks noGrp="1"/>
+          </p:cNvSpPr>
+          <p:nvPr>
+            <p:ph type="title"/>
+          </p:nvPr>
+        </p:nvSpPr>
+        <p:spPr/>
+        <p:txBody>
+          <a:bodyPr/>
+          <a:lstStyle/>
+          <a:p>
+            <a:pPr lvl="0" indent="0" marL="0">
+              <a:buNone/>
+            </a:pPr>
+            <a:r>
+              <a:rPr/>
+              <a:t>Merges</a:t>
+            </a:r>
+          </a:p>
+        </p:txBody>
+      </p:sp>
+      <p:sp>
+        <p:nvSpPr>
+          <p:cNvPr id="3" name="Content Placeholder 2"/>
+          <p:cNvSpPr>
+            <a:spLocks noGrp="1"/>
+          </p:cNvSpPr>
+          <p:nvPr>
+            <p:ph idx="1"/>
+          </p:nvPr>
+        </p:nvSpPr>
+        <p:spPr/>
+        <p:txBody>
+          <a:bodyPr/>
+          <a:lstStyle/>
+          <a:p>
+            <a:pPr lvl="0"/>
+            <a:r>
+              <a:rPr/>
+              <a:t>when your ready, merge your changes into the main branch with </a:t>
+            </a:r>
+            <a:r>
+              <a:rPr>
+                <a:latin typeface="Courier"/>
+              </a:rPr>
+              <a:t>git switch main &amp;&amp; git merge &lt;branch-name&gt;</a:t>
+            </a:r>
+          </a:p>
+          <a:p>
+            <a:pPr lvl="0"/>
+            <a:r>
+              <a:rPr/>
+              <a:t>all changes to the branch will be reflected in main</a:t>
+            </a:r>
+          </a:p>
+        </p:txBody>
+      </p:sp>
+    </p:spTree>
+  </p:cSld>
+</p:sld>
+</file>
+
+<file path=ppt/slides/slide14.xml><?xml version="1.0" encoding="utf-8"?>
+<p:sld xmlns:a="http://schemas.openxmlformats.org/drawingml/2006/main" xmlns:r="http://schemas.openxmlformats.org/officeDocument/2006/relationships" xmlns:p="http://schemas.openxmlformats.org/presentationml/2006/main">
+  <p:cSld>
+    <p:spTree>
+      <p:nvGrpSpPr>
+        <p:cNvPr id="1" name=""/>
+        <p:cNvGrpSpPr/>
+        <p:nvPr/>
+      </p:nvGrpSpPr>
+      <p:grpSpPr>
+        <a:xfrm>
+          <a:off x="0" y="0"/>
+          <a:ext cx="0" cy="0"/>
+          <a:chOff x="0" y="0"/>
+          <a:chExt cx="0" cy="0"/>
+        </a:xfrm>
+      </p:grpSpPr>
+      <p:sp>
+        <p:nvSpPr>
+          <p:cNvPr id="2" name="Title 1"/>
+          <p:cNvSpPr>
+            <a:spLocks noGrp="1"/>
+          </p:cNvSpPr>
+          <p:nvPr>
+            <p:ph type="title"/>
+          </p:nvPr>
+        </p:nvSpPr>
+        <p:spPr/>
+        <p:txBody>
+          <a:bodyPr/>
+          <a:lstStyle/>
+          <a:p>
+            <a:pPr lvl="0" indent="0" marL="0">
+              <a:buNone/>
+            </a:pPr>
+            <a:r>
+              <a:rPr/>
+              <a:t>Fork/PR</a:t>
+            </a:r>
+          </a:p>
+        </p:txBody>
+      </p:sp>
+      <p:sp>
+        <p:nvSpPr>
+          <p:cNvPr id="3" name="Content Placeholder 2"/>
+          <p:cNvSpPr>
+            <a:spLocks noGrp="1"/>
+          </p:cNvSpPr>
+          <p:nvPr>
+            <p:ph idx="1"/>
+          </p:nvPr>
+        </p:nvSpPr>
+        <p:spPr/>
+        <p:txBody>
+          <a:bodyPr/>
+          <a:lstStyle/>
+          <a:p>
+            <a:pPr lvl="0"/>
+            <a:r>
+              <a:rPr/>
+              <a:t>not everybody can edit your repo</a:t>
+            </a:r>
+          </a:p>
+          <a:p>
+            <a:pPr lvl="0"/>
+            <a:r>
+              <a:rPr/>
+              <a:t>anybody can copy it</a:t>
+            </a:r>
+          </a:p>
+          <a:p>
+            <a:pPr lvl="0"/>
+            <a:r>
+              <a:rPr/>
+              <a:t>pull requests are the official way to ask a project maintainer to pull your changes into their project. usually they’ll review your changes and either accept the pull, offer suggestions you should change before they pull, or deny it altogether.</a:t>
+            </a:r>
+          </a:p>
+        </p:txBody>
+      </p:sp>
+    </p:spTree>
+  </p:cSld>
+</p:sld>
+</file>
+
+<file path=ppt/slides/slide15.xml><?xml version="1.0" encoding="utf-8"?>
+<p:sld xmlns:a="http://schemas.openxmlformats.org/drawingml/2006/main" xmlns:r="http://schemas.openxmlformats.org/officeDocument/2006/relationships" xmlns:p="http://schemas.openxmlformats.org/presentationml/2006/main">
+  <p:cSld>
+    <p:spTree>
+      <p:nvGrpSpPr>
+        <p:cNvPr id="1" name=""/>
+        <p:cNvGrpSpPr/>
+        <p:nvPr/>
+      </p:nvGrpSpPr>
+      <p:grpSpPr>
+        <a:xfrm>
+          <a:off x="0" y="0"/>
+          <a:ext cx="0" cy="0"/>
+          <a:chOff x="0" y="0"/>
+          <a:chExt cx="0" cy="0"/>
+        </a:xfrm>
+      </p:grpSpPr>
+      <p:sp>
+        <p:nvSpPr>
+          <p:cNvPr id="2" name="Title 1"/>
+          <p:cNvSpPr>
+            <a:spLocks noGrp="1"/>
+          </p:cNvSpPr>
+          <p:nvPr>
+            <p:ph type="title"/>
+          </p:nvPr>
+        </p:nvSpPr>
+        <p:spPr/>
+        <p:txBody>
+          <a:bodyPr/>
+          <a:lstStyle/>
+          <a:p>
+            <a:pPr lvl="0" indent="0" marL="0">
+              <a:buNone/>
+            </a:pPr>
+            <a:r>
+              <a:rPr/>
+              <a:t>Fork cont.</a:t>
+            </a:r>
+          </a:p>
+        </p:txBody>
+      </p:sp>
+      <p:sp>
+        <p:nvSpPr>
+          <p:cNvPr id="3" name="Content Placeholder 2"/>
+          <p:cNvSpPr>
+            <a:spLocks noGrp="1"/>
+          </p:cNvSpPr>
+          <p:nvPr>
+            <p:ph idx="1"/>
+          </p:nvPr>
+        </p:nvSpPr>
+        <p:spPr/>
+        <p:txBody>
+          <a:bodyPr/>
+          <a:lstStyle/>
+          <a:p>
+            <a:pPr lvl="0"/>
+            <a:r>
+              <a:rPr/>
+              <a:t>to contribute to someone else’s project there are a few steps:</a:t>
+            </a:r>
+          </a:p>
+          <a:p>
+            <a:pPr lvl="1"/>
+            <a:r>
+              <a:rPr/>
+              <a:t>‘fork’ the repo: usually a ‘fork’ button at the top of a repo’s page</a:t>
+            </a:r>
+          </a:p>
+          <a:p>
+            <a:pPr lvl="1"/>
+            <a:r>
+              <a:rPr/>
+              <a:t>run </a:t>
+            </a:r>
+            <a:r>
+              <a:rPr>
+                <a:latin typeface="Courier"/>
+              </a:rPr>
+              <a:t>git clone &lt;forked-repo&gt;</a:t>
+            </a:r>
+          </a:p>
+          <a:p>
+            <a:pPr lvl="1"/>
+            <a:r>
+              <a:rPr/>
+              <a:t>make your changes &amp; </a:t>
+            </a:r>
+            <a:r>
+              <a:rPr>
+                <a:latin typeface="Courier"/>
+              </a:rPr>
+              <a:t>git commit &amp;&amp; git push</a:t>
+            </a:r>
+          </a:p>
+          <a:p>
+            <a:pPr lvl="1"/>
+            <a:r>
+              <a:rPr/>
+              <a:t>submit a ‘pull request’</a:t>
+            </a:r>
+          </a:p>
+        </p:txBody>
+      </p:sp>
+    </p:spTree>
+  </p:cSld>
+</p:sld>
+</file>
+
+<file path=ppt/slides/slide16.xml><?xml version="1.0" encoding="utf-8"?>
+<p:sld xmlns:a="http://schemas.openxmlformats.org/drawingml/2006/main" xmlns:r="http://schemas.openxmlformats.org/officeDocument/2006/relationships" xmlns:p="http://schemas.openxmlformats.org/presentationml/2006/main">
+  <p:cSld>
+    <p:spTree>
+      <p:nvGrpSpPr>
+        <p:cNvPr id="1" name=""/>
+        <p:cNvGrpSpPr/>
+        <p:nvPr/>
+      </p:nvGrpSpPr>
+      <p:grpSpPr>
+        <a:xfrm>
+          <a:off x="0" y="0"/>
+          <a:ext cx="0" cy="0"/>
+          <a:chOff x="0" y="0"/>
+          <a:chExt cx="0" cy="0"/>
+        </a:xfrm>
+      </p:grpSpPr>
+      <p:sp>
+        <p:nvSpPr>
+          <p:cNvPr id="2" name="Title 1"/>
+          <p:cNvSpPr>
+            <a:spLocks noGrp="1"/>
+          </p:cNvSpPr>
+          <p:nvPr>
+            <p:ph type="title"/>
+          </p:nvPr>
+        </p:nvSpPr>
+        <p:spPr>
+          <a:xfrm>
+            <a:off x="722313" y="3305176"/>
+            <a:ext cx="7772400" cy="1021556"/>
+          </a:xfrm>
+        </p:spPr>
+        <p:txBody>
+          <a:bodyPr/>
+          <a:lstStyle/>
+          <a:p>
+            <a:pPr lvl="0" indent="0" marL="0">
+              <a:buNone/>
+            </a:pPr>
+            <a:r>
+              <a:rPr/>
+              <a:t>Practical Examples</a:t>
+            </a:r>
+          </a:p>
+        </p:txBody>
+      </p:sp>
+    </p:spTree>
+  </p:cSld>
+</p:sld>
+</file>
+
+<file path=ppt/slides/slide17.xml><?xml version="1.0" encoding="utf-8"?>
+<p:sld xmlns:a="http://schemas.openxmlformats.org/drawingml/2006/main" xmlns:r="http://schemas.openxmlformats.org/officeDocument/2006/relationships" xmlns:p="http://schemas.openxmlformats.org/presentationml/2006/main">
+  <p:cSld>
+    <p:spTree>
+      <p:nvGrpSpPr>
+        <p:cNvPr id="1" name=""/>
+        <p:cNvGrpSpPr/>
+        <p:nvPr/>
+      </p:nvGrpSpPr>
+      <p:grpSpPr>
+        <a:xfrm>
+          <a:off x="0" y="0"/>
+          <a:ext cx="0" cy="0"/>
+          <a:chOff x="0" y="0"/>
+          <a:chExt cx="0" cy="0"/>
+        </a:xfrm>
+      </p:grpSpPr>
+      <p:sp>
+        <p:nvSpPr>
+          <p:cNvPr id="2" name="Title 1"/>
+          <p:cNvSpPr>
+            <a:spLocks noGrp="1"/>
+          </p:cNvSpPr>
+          <p:nvPr>
+            <p:ph type="title"/>
+          </p:nvPr>
+        </p:nvSpPr>
+        <p:spPr/>
+        <p:txBody>
+          <a:bodyPr/>
+          <a:lstStyle/>
+          <a:p>
+            <a:pPr lvl="0" indent="0" marL="0">
+              <a:buNone/>
+            </a:pPr>
+            <a:r>
+              <a:rPr/>
+              <a:t>Stashing</a:t>
+            </a:r>
+          </a:p>
+        </p:txBody>
+      </p:sp>
+      <p:sp>
+        <p:nvSpPr>
+          <p:cNvPr id="3" name="Content Placeholder 2"/>
+          <p:cNvSpPr>
+            <a:spLocks noGrp="1"/>
+          </p:cNvSpPr>
+          <p:nvPr>
+            <p:ph idx="1"/>
+          </p:nvPr>
+        </p:nvSpPr>
+        <p:spPr/>
+        <p:txBody>
+          <a:bodyPr/>
+          <a:lstStyle/>
+          <a:p>
+            <a:pPr lvl="0"/>
+            <a:r>
+              <a:rPr/>
+              <a:t>we all make mistakes</a:t>
+            </a:r>
+          </a:p>
+          <a:p>
+            <a:pPr lvl="0"/>
+            <a:r>
+              <a:rPr/>
+              <a:t>what if we’ve made changes somewhere we don’t want to</a:t>
+            </a:r>
+          </a:p>
+          <a:p>
+            <a:pPr lvl="0"/>
+            <a:r>
+              <a:rPr/>
+              <a:t>just </a:t>
+            </a:r>
+            <a:r>
+              <a:rPr>
+                <a:latin typeface="Courier"/>
+              </a:rPr>
+              <a:t>git stash</a:t>
+            </a:r>
+          </a:p>
+        </p:txBody>
+      </p:sp>
+    </p:spTree>
+  </p:cSld>
+</p:sld>
+</file>
+
+<file path=ppt/slides/slide18.xml><?xml version="1.0" encoding="utf-8"?>
+<p:sld xmlns:a="http://schemas.openxmlformats.org/drawingml/2006/main" xmlns:r="http://schemas.openxmlformats.org/officeDocument/2006/relationships" xmlns:p="http://schemas.openxmlformats.org/presentationml/2006/main">
+  <p:cSld>
+    <p:spTree>
+      <p:nvGrpSpPr>
+        <p:cNvPr id="1" name=""/>
+        <p:cNvGrpSpPr/>
+        <p:nvPr/>
+      </p:nvGrpSpPr>
+      <p:grpSpPr>
+        <a:xfrm>
+          <a:off x="0" y="0"/>
+          <a:ext cx="0" cy="0"/>
+          <a:chOff x="0" y="0"/>
+          <a:chExt cx="0" cy="0"/>
+        </a:xfrm>
+      </p:grpSpPr>
+      <p:sp>
+        <p:nvSpPr>
+          <p:cNvPr id="2" name="Title 1"/>
+          <p:cNvSpPr>
+            <a:spLocks noGrp="1"/>
+          </p:cNvSpPr>
+          <p:nvPr>
+            <p:ph type="title"/>
+          </p:nvPr>
+        </p:nvSpPr>
+        <p:spPr/>
+        <p:txBody>
+          <a:bodyPr/>
+          <a:lstStyle/>
+          <a:p>
+            <a:pPr lvl="0" indent="0" marL="0">
+              <a:buNone/>
+            </a:pPr>
+            <a:r>
+              <a:rPr/>
+              <a:t>Stashing cont.</a:t>
+            </a:r>
+          </a:p>
+        </p:txBody>
+      </p:sp>
+      <p:sp>
+        <p:nvSpPr>
+          <p:cNvPr id="3" name="Content Placeholder 2"/>
+          <p:cNvSpPr>
+            <a:spLocks noGrp="1"/>
+          </p:cNvSpPr>
+          <p:nvPr>
+            <p:ph idx="1"/>
+          </p:nvPr>
+        </p:nvSpPr>
+        <p:spPr/>
+        <p:txBody>
+          <a:bodyPr/>
+          <a:lstStyle/>
+          <a:p>
+            <a:pPr lvl="0"/>
+            <a:r>
+              <a:rPr/>
+              <a:t>this will tuck away your changes where you can retrieve them later and restore your active tree to it’s previous state</a:t>
+            </a:r>
+          </a:p>
+          <a:p>
+            <a:pPr lvl="0"/>
+            <a:r>
+              <a:rPr/>
+              <a:t>e.g. you made changes to the wrong branch</a:t>
+            </a:r>
+          </a:p>
+          <a:p>
+            <a:pPr lvl="1"/>
+            <a:r>
+              <a:rPr>
+                <a:latin typeface="Courier"/>
+              </a:rPr>
+              <a:t>git stash</a:t>
+            </a:r>
+          </a:p>
+          <a:p>
+            <a:pPr lvl="1"/>
+            <a:r>
+              <a:rPr>
+                <a:latin typeface="Courier"/>
+              </a:rPr>
+              <a:t>git switch &lt;correct-branch&gt;</a:t>
+            </a:r>
+          </a:p>
+          <a:p>
+            <a:pPr lvl="1"/>
+            <a:r>
+              <a:rPr>
+                <a:latin typeface="Courier"/>
+              </a:rPr>
+              <a:t>git stash pop</a:t>
+            </a:r>
+          </a:p>
+        </p:txBody>
+      </p:sp>
+    </p:spTree>
+  </p:cSld>
+</p:sld>
+</file>
+
+<file path=ppt/slides/slide19.xml><?xml version="1.0" encoding="utf-8"?>
+<p:sld xmlns:a="http://schemas.openxmlformats.org/drawingml/2006/main" xmlns:r="http://schemas.openxmlformats.org/officeDocument/2006/relationships" xmlns:p="http://schemas.openxmlformats.org/presentationml/2006/main">
+  <p:cSld>
+    <p:spTree>
+      <p:nvGrpSpPr>
+        <p:cNvPr id="1" name=""/>
+        <p:cNvGrpSpPr/>
+        <p:nvPr/>
+      </p:nvGrpSpPr>
+      <p:grpSpPr>
+        <a:xfrm>
+          <a:off x="0" y="0"/>
+          <a:ext cx="0" cy="0"/>
+          <a:chOff x="0" y="0"/>
+          <a:chExt cx="0" cy="0"/>
+        </a:xfrm>
+      </p:grpSpPr>
+      <p:sp>
+        <p:nvSpPr>
+          <p:cNvPr id="2" name="Title 1"/>
+          <p:cNvSpPr>
+            <a:spLocks noGrp="1"/>
+          </p:cNvSpPr>
+          <p:nvPr>
+            <p:ph type="title"/>
+          </p:nvPr>
+        </p:nvSpPr>
+        <p:spPr/>
+        <p:txBody>
+          <a:bodyPr/>
+          <a:lstStyle/>
+          <a:p>
+            <a:pPr lvl="0" indent="0" marL="0">
+              <a:buNone/>
+            </a:pPr>
+            <a:r>
+              <a:rPr/>
+              <a:t>Collaboration</a:t>
             </a:r>
           </a:p>
         </p:txBody>
@@ -3148,7 +4076,12 @@
             <p:ph type="title"/>
           </p:nvPr>
         </p:nvSpPr>
-        <p:spPr/>
+        <p:spPr>
+          <a:xfrm>
+            <a:off x="722313" y="3305176"/>
+            <a:ext cx="7772400" cy="1021556"/>
+          </a:xfrm>
+        </p:spPr>
         <p:txBody>
           <a:bodyPr/>
           <a:lstStyle/>
@@ -3158,6 +4091,410 @@
             </a:pPr>
             <a:r>
               <a:rPr/>
+              <a:t>What is Git/GitHub</a:t>
+            </a:r>
+          </a:p>
+        </p:txBody>
+      </p:sp>
+    </p:spTree>
+  </p:cSld>
+</p:sld>
+</file>
+
+<file path=ppt/slides/slide20.xml><?xml version="1.0" encoding="utf-8"?>
+<p:sld xmlns:a="http://schemas.openxmlformats.org/drawingml/2006/main" xmlns:r="http://schemas.openxmlformats.org/officeDocument/2006/relationships" xmlns:p="http://schemas.openxmlformats.org/presentationml/2006/main">
+  <p:cSld>
+    <p:spTree>
+      <p:nvGrpSpPr>
+        <p:cNvPr id="1" name=""/>
+        <p:cNvGrpSpPr/>
+        <p:nvPr/>
+      </p:nvGrpSpPr>
+      <p:grpSpPr>
+        <a:xfrm>
+          <a:off x="0" y="0"/>
+          <a:ext cx="0" cy="0"/>
+          <a:chOff x="0" y="0"/>
+          <a:chExt cx="0" cy="0"/>
+        </a:xfrm>
+      </p:grpSpPr>
+      <p:sp>
+        <p:nvSpPr>
+          <p:cNvPr id="2" name="Title 1"/>
+          <p:cNvSpPr>
+            <a:spLocks noGrp="1"/>
+          </p:cNvSpPr>
+          <p:nvPr>
+            <p:ph type="title"/>
+          </p:nvPr>
+        </p:nvSpPr>
+        <p:spPr/>
+        <p:txBody>
+          <a:bodyPr/>
+          <a:lstStyle/>
+          <a:p>
+            <a:pPr lvl="0" indent="0" marL="0">
+              <a:buNone/>
+            </a:pPr>
+            <a:r>
+              <a:rPr/>
+              <a:t>Oh crap</a:t>
+            </a:r>
+          </a:p>
+        </p:txBody>
+      </p:sp>
+      <p:sp>
+        <p:nvSpPr>
+          <p:cNvPr id="3" name="Content Placeholder 2"/>
+          <p:cNvSpPr>
+            <a:spLocks noGrp="1"/>
+          </p:cNvSpPr>
+          <p:nvPr>
+            <p:ph idx="1"/>
+          </p:nvPr>
+        </p:nvSpPr>
+        <p:spPr/>
+        <p:txBody>
+          <a:bodyPr/>
+          <a:lstStyle/>
+          <a:p>
+            <a:pPr lvl="0"/>
+            <a:r>
+              <a:rPr/>
+              <a:t>you deleted a file in your tree and your IDE doesn’t have it anywhere in it’s history</a:t>
+            </a:r>
+          </a:p>
+          <a:p>
+            <a:pPr lvl="0"/>
+            <a:r>
+              <a:rPr/>
+              <a:t>just </a:t>
+            </a:r>
+            <a:r>
+              <a:rPr>
+                <a:latin typeface="Courier"/>
+              </a:rPr>
+              <a:t>git checkout &lt;last-commit-with-file&gt; &lt;file&gt;</a:t>
+            </a:r>
+          </a:p>
+          <a:p>
+            <a:pPr lvl="0"/>
+            <a:r>
+              <a:rPr/>
+              <a:t>the file has returned to it’s last commit’ed state</a:t>
+            </a:r>
+          </a:p>
+          <a:p>
+            <a:pPr lvl="0"/>
+            <a:r>
+              <a:rPr/>
+              <a:t>this is why it’s important to commit after each meaningful change</a:t>
+            </a:r>
+          </a:p>
+        </p:txBody>
+      </p:sp>
+    </p:spTree>
+  </p:cSld>
+</p:sld>
+</file>
+
+<file path=ppt/slides/slide21.xml><?xml version="1.0" encoding="utf-8"?>
+<p:sld xmlns:a="http://schemas.openxmlformats.org/drawingml/2006/main" xmlns:r="http://schemas.openxmlformats.org/officeDocument/2006/relationships" xmlns:p="http://schemas.openxmlformats.org/presentationml/2006/main">
+  <p:cSld>
+    <p:spTree>
+      <p:nvGrpSpPr>
+        <p:cNvPr id="1" name=""/>
+        <p:cNvGrpSpPr/>
+        <p:nvPr/>
+      </p:nvGrpSpPr>
+      <p:grpSpPr>
+        <a:xfrm>
+          <a:off x="0" y="0"/>
+          <a:ext cx="0" cy="0"/>
+          <a:chOff x="0" y="0"/>
+          <a:chExt cx="0" cy="0"/>
+        </a:xfrm>
+      </p:grpSpPr>
+      <p:sp>
+        <p:nvSpPr>
+          <p:cNvPr id="2" name="Title 1"/>
+          <p:cNvSpPr>
+            <a:spLocks noGrp="1"/>
+          </p:cNvSpPr>
+          <p:nvPr>
+            <p:ph type="title"/>
+          </p:nvPr>
+        </p:nvSpPr>
+        <p:spPr/>
+        <p:txBody>
+          <a:bodyPr/>
+          <a:lstStyle/>
+          <a:p>
+            <a:pPr lvl="0" indent="0" marL="0">
+              <a:buNone/>
+            </a:pPr>
+            <a:r>
+              <a:rPr/>
+              <a:t>Upstream Changes</a:t>
+            </a:r>
+          </a:p>
+        </p:txBody>
+      </p:sp>
+      <p:sp>
+        <p:nvSpPr>
+          <p:cNvPr id="3" name="Content Placeholder 2"/>
+          <p:cNvSpPr>
+            <a:spLocks noGrp="1"/>
+          </p:cNvSpPr>
+          <p:nvPr>
+            <p:ph idx="1"/>
+          </p:nvPr>
+        </p:nvSpPr>
+        <p:spPr/>
+        <p:txBody>
+          <a:bodyPr/>
+          <a:lstStyle/>
+          <a:p>
+            <a:pPr lvl="0"/>
+            <a:r>
+              <a:rPr/>
+              <a:t>your working on a fork of a project</a:t>
+            </a:r>
+          </a:p>
+          <a:p>
+            <a:pPr lvl="0"/>
+            <a:r>
+              <a:rPr/>
+              <a:t>the upstream project has made changes</a:t>
+            </a:r>
+          </a:p>
+          <a:p>
+            <a:pPr lvl="0"/>
+            <a:r>
+              <a:rPr/>
+              <a:t>you can’t submit a PR unless your fork includes those changes</a:t>
+            </a:r>
+          </a:p>
+          <a:p>
+            <a:pPr lvl="0"/>
+            <a:r>
+              <a:rPr/>
+              <a:t>the GitHub Web-UI provides a way to do this</a:t>
+            </a:r>
+          </a:p>
+          <a:p>
+            <a:pPr lvl="0"/>
+            <a:r>
+              <a:rPr/>
+              <a:t>there’s an easier way:</a:t>
+            </a:r>
+          </a:p>
+          <a:p>
+            <a:pPr lvl="0"/>
+            <a:r>
+              <a:rPr>
+                <a:latin typeface="Courier"/>
+              </a:rPr>
+              <a:t>git remote add &lt;upstream-url&gt;.git</a:t>
+            </a:r>
+          </a:p>
+          <a:p>
+            <a:pPr lvl="0"/>
+            <a:r>
+              <a:rPr>
+                <a:latin typeface="Courier"/>
+              </a:rPr>
+              <a:t>git fetch upstream</a:t>
+            </a:r>
+          </a:p>
+          <a:p>
+            <a:pPr lvl="0"/>
+            <a:r>
+              <a:rPr>
+                <a:latin typeface="Courier"/>
+              </a:rPr>
+              <a:t>git rebase upstream</a:t>
+            </a:r>
+          </a:p>
+        </p:txBody>
+      </p:sp>
+    </p:spTree>
+  </p:cSld>
+</p:sld>
+</file>
+
+<file path=ppt/slides/slide22.xml><?xml version="1.0" encoding="utf-8"?>
+<p:sld xmlns:a="http://schemas.openxmlformats.org/drawingml/2006/main" xmlns:r="http://schemas.openxmlformats.org/officeDocument/2006/relationships" xmlns:p="http://schemas.openxmlformats.org/presentationml/2006/main">
+  <p:cSld>
+    <p:spTree>
+      <p:nvGrpSpPr>
+        <p:cNvPr id="1" name=""/>
+        <p:cNvGrpSpPr/>
+        <p:nvPr/>
+      </p:nvGrpSpPr>
+      <p:grpSpPr>
+        <a:xfrm>
+          <a:off x="0" y="0"/>
+          <a:ext cx="0" cy="0"/>
+          <a:chOff x="0" y="0"/>
+          <a:chExt cx="0" cy="0"/>
+        </a:xfrm>
+      </p:grpSpPr>
+      <p:sp>
+        <p:nvSpPr>
+          <p:cNvPr id="2" name="Title 1"/>
+          <p:cNvSpPr>
+            <a:spLocks noGrp="1"/>
+          </p:cNvSpPr>
+          <p:nvPr>
+            <p:ph type="title"/>
+          </p:nvPr>
+        </p:nvSpPr>
+        <p:spPr/>
+        <p:txBody>
+          <a:bodyPr/>
+          <a:lstStyle/>
+          <a:p>
+            <a:pPr lvl="0" indent="0" marL="0">
+              <a:buNone/>
+            </a:pPr>
+            <a:r>
+              <a:rPr/>
+              <a:t>Tagged Commits</a:t>
+            </a:r>
+          </a:p>
+        </p:txBody>
+      </p:sp>
+      <p:sp>
+        <p:nvSpPr>
+          <p:cNvPr id="3" name="Content Placeholder 2"/>
+          <p:cNvSpPr>
+            <a:spLocks noGrp="1"/>
+          </p:cNvSpPr>
+          <p:nvPr>
+            <p:ph idx="1"/>
+          </p:nvPr>
+        </p:nvSpPr>
+        <p:spPr/>
+        <p:txBody>
+          <a:bodyPr/>
+          <a:lstStyle/>
+          <a:p>
+            <a:pPr lvl="0"/>
+            <a:r>
+              <a:rPr/>
+              <a:t>you’re working on a project that people regularly install and depend on</a:t>
+            </a:r>
+          </a:p>
+          <a:p>
+            <a:pPr lvl="0"/>
+            <a:r>
+              <a:rPr/>
+              <a:t>you want to keep your repository current with your changes, but these changes may not be stable</a:t>
+            </a:r>
+          </a:p>
+          <a:p>
+            <a:pPr lvl="0"/>
+            <a:r>
+              <a:rPr/>
+              <a:t>you could use a different branch, but this isn’t very transparent to the users nor is it best practice</a:t>
+            </a:r>
+          </a:p>
+          <a:p>
+            <a:pPr lvl="0"/>
+            <a:r>
+              <a:rPr/>
+              <a:t>enter tagged commits</a:t>
+            </a:r>
+          </a:p>
+          <a:p>
+            <a:pPr lvl="0"/>
+            <a:r>
+              <a:rPr/>
+              <a:t>any commit that you designate can be tagged.</a:t>
+            </a:r>
+          </a:p>
+          <a:p>
+            <a:pPr lvl="0"/>
+            <a:r>
+              <a:rPr/>
+              <a:t>this is useful for showing your users which commit to use e.g. “release version”</a:t>
+            </a:r>
+          </a:p>
+          <a:p>
+            <a:pPr lvl="0"/>
+            <a:r>
+              <a:rPr/>
+              <a:t>tags can be made at commit time with </a:t>
+            </a:r>
+            <a:r>
+              <a:rPr>
+                <a:latin typeface="Courier"/>
+              </a:rPr>
+              <a:t>git commmit -m "&lt;your-tag-here&gt;"</a:t>
+            </a:r>
+            <a:r>
+              <a:rPr/>
+              <a:t> or afterwards with </a:t>
+            </a:r>
+            <a:r>
+              <a:rPr>
+                <a:latin typeface="Courier"/>
+              </a:rPr>
+              <a:t>git tag -a "&lt;your-tag&gt;" &lt;commit-hash&gt;</a:t>
+            </a:r>
+          </a:p>
+          <a:p>
+            <a:pPr lvl="0"/>
+            <a:r>
+              <a:rPr/>
+              <a:t>now when your users setup your project, then can rest assured that the major version tagged commit “should” be stable</a:t>
+            </a:r>
+          </a:p>
+        </p:txBody>
+      </p:sp>
+    </p:spTree>
+  </p:cSld>
+</p:sld>
+</file>
+
+<file path=ppt/slides/slide3.xml><?xml version="1.0" encoding="utf-8"?>
+<p:sld xmlns:a="http://schemas.openxmlformats.org/drawingml/2006/main" xmlns:r="http://schemas.openxmlformats.org/officeDocument/2006/relationships" xmlns:p="http://schemas.openxmlformats.org/presentationml/2006/main">
+  <p:cSld>
+    <p:spTree>
+      <p:nvGrpSpPr>
+        <p:cNvPr id="1" name=""/>
+        <p:cNvGrpSpPr/>
+        <p:nvPr/>
+      </p:nvGrpSpPr>
+      <p:grpSpPr>
+        <a:xfrm>
+          <a:off x="0" y="0"/>
+          <a:ext cx="0" cy="0"/>
+          <a:chOff x="0" y="0"/>
+          <a:chExt cx="0" cy="0"/>
+        </a:xfrm>
+      </p:grpSpPr>
+      <p:sp>
+        <p:nvSpPr>
+          <p:cNvPr id="2" name="Title 1"/>
+          <p:cNvSpPr>
+            <a:spLocks noGrp="1"/>
+          </p:cNvSpPr>
+          <p:nvPr>
+            <p:ph type="title"/>
+          </p:nvPr>
+        </p:nvSpPr>
+        <p:spPr/>
+        <p:txBody>
+          <a:bodyPr/>
+          <a:lstStyle/>
+          <a:p>
+            <a:pPr lvl="0" indent="0" marL="0">
+              <a:buNone/>
+            </a:pPr>
+            <a:r>
+              <a:rPr/>
               <a:t>What git is not</a:t>
             </a:r>
           </a:p>
@@ -3192,196 +4529,445 @@
             </a:r>
           </a:p>
           <a:p>
+            <a:pPr lvl="0"/>
+            <a:r>
+              <a:rPr/>
+              <a:t>Git is not any kind of web-service!</a:t>
+            </a:r>
+          </a:p>
+        </p:txBody>
+      </p:sp>
+    </p:spTree>
+  </p:cSld>
+</p:sld>
+</file>
+
+<file path=ppt/slides/slide4.xml><?xml version="1.0" encoding="utf-8"?>
+<p:sld xmlns:a="http://schemas.openxmlformats.org/drawingml/2006/main" xmlns:r="http://schemas.openxmlformats.org/officeDocument/2006/relationships" xmlns:p="http://schemas.openxmlformats.org/presentationml/2006/main">
+  <p:cSld>
+    <p:spTree>
+      <p:nvGrpSpPr>
+        <p:cNvPr id="1" name=""/>
+        <p:cNvGrpSpPr/>
+        <p:nvPr/>
+      </p:nvGrpSpPr>
+      <p:grpSpPr>
+        <a:xfrm>
+          <a:off x="0" y="0"/>
+          <a:ext cx="0" cy="0"/>
+          <a:chOff x="0" y="0"/>
+          <a:chExt cx="0" cy="0"/>
+        </a:xfrm>
+      </p:grpSpPr>
+      <p:sp>
+        <p:nvSpPr>
+          <p:cNvPr id="2" name="Title 1"/>
+          <p:cNvSpPr>
+            <a:spLocks noGrp="1"/>
+          </p:cNvSpPr>
+          <p:nvPr>
+            <p:ph type="title"/>
+          </p:nvPr>
+        </p:nvSpPr>
+        <p:spPr/>
+        <p:txBody>
+          <a:bodyPr/>
+          <a:lstStyle/>
+          <a:p>
             <a:pPr lvl="0" indent="0" marL="0">
-              <a:spcBef>
-                <a:spcPts val="3000"/>
-              </a:spcBef>
               <a:buNone/>
             </a:pPr>
             <a:r>
-              <a:rPr b="1"/>
-              <a:t>Git is not any kind of web-service!</a:t>
-            </a:r>
-          </a:p>
+              <a:rPr/>
+              <a:t>The problem Git solves/ What is versioning</a:t>
+            </a:r>
+          </a:p>
+        </p:txBody>
+      </p:sp>
+      <p:sp>
+        <p:nvSpPr>
+          <p:cNvPr id="3" name="Content Placeholder 2"/>
+          <p:cNvSpPr>
+            <a:spLocks noGrp="1"/>
+          </p:cNvSpPr>
+          <p:nvPr>
+            <p:ph idx="1"/>
+          </p:nvPr>
+        </p:nvSpPr>
+        <p:spPr/>
+        <p:txBody>
+          <a:bodyPr/>
+          <a:lstStyle/>
+          <a:p>
+            <a:pPr lvl="0"/>
+            <a:r>
+              <a:rPr/>
+              <a:t>scenario of versioning headaches</a:t>
+            </a:r>
+          </a:p>
+          <a:p>
+            <a:pPr lvl="0"/>
+            <a:r>
+              <a:rPr/>
+              <a:t>Hook: what if it was easier</a:t>
+            </a:r>
+          </a:p>
+          <a:p>
+            <a:pPr lvl="0"/>
+            <a:r>
+              <a:rPr/>
+              <a:t>change-based versioning</a:t>
+            </a:r>
+          </a:p>
+          <a:p>
+            <a:pPr lvl="0"/>
+            <a:r>
+              <a:rPr/>
+              <a:t>snapshot-based versioning</a:t>
+            </a:r>
+          </a:p>
+        </p:txBody>
+      </p:sp>
+    </p:spTree>
+  </p:cSld>
+</p:sld>
+</file>
+
+<file path=ppt/slides/slide5.xml><?xml version="1.0" encoding="utf-8"?>
+<p:sld xmlns:a="http://schemas.openxmlformats.org/drawingml/2006/main" xmlns:r="http://schemas.openxmlformats.org/officeDocument/2006/relationships" xmlns:p="http://schemas.openxmlformats.org/presentationml/2006/main">
+  <p:cSld>
+    <p:spTree>
+      <p:nvGrpSpPr>
+        <p:cNvPr id="1" name=""/>
+        <p:cNvGrpSpPr/>
+        <p:nvPr/>
+      </p:nvGrpSpPr>
+      <p:grpSpPr>
+        <a:xfrm>
+          <a:off x="0" y="0"/>
+          <a:ext cx="0" cy="0"/>
+          <a:chOff x="0" y="0"/>
+          <a:chExt cx="0" cy="0"/>
+        </a:xfrm>
+      </p:grpSpPr>
+      <p:sp>
+        <p:nvSpPr>
+          <p:cNvPr id="2" name="Title 1"/>
+          <p:cNvSpPr>
+            <a:spLocks noGrp="1"/>
+          </p:cNvSpPr>
+          <p:nvPr>
+            <p:ph type="title"/>
+          </p:nvPr>
+        </p:nvSpPr>
+        <p:spPr/>
+        <p:txBody>
+          <a:bodyPr/>
+          <a:lstStyle/>
           <a:p>
             <a:pPr lvl="0" indent="0" marL="0">
-              <a:spcBef>
-                <a:spcPts val="3000"/>
-              </a:spcBef>
               <a:buNone/>
             </a:pPr>
             <a:r>
-              <a:rPr b="1"/>
-              <a:t>The problem Git solves/ What is versioning</a:t>
-            </a:r>
-          </a:p>
-          <a:p>
-            <a:pPr lvl="0"/>
-            <a:r>
-              <a:rPr/>
-              <a:t>scenario of versioning headaches</a:t>
-            </a:r>
-          </a:p>
-          <a:p>
-            <a:pPr lvl="0"/>
-            <a:r>
-              <a:rPr/>
-              <a:t>Hook: what if it was easier</a:t>
-            </a:r>
-          </a:p>
-          <a:p>
-            <a:pPr lvl="0"/>
-            <a:r>
-              <a:rPr/>
-              <a:t>change-based versioning</a:t>
-            </a:r>
-          </a:p>
+              <a:rPr/>
+              <a:t>Real Definition</a:t>
+            </a:r>
+          </a:p>
+        </p:txBody>
+      </p:sp>
+      <p:sp>
+        <p:nvSpPr>
+          <p:cNvPr id="3" name="Content Placeholder 2"/>
+          <p:cNvSpPr>
+            <a:spLocks noGrp="1"/>
+          </p:cNvSpPr>
+          <p:nvPr>
+            <p:ph idx="1"/>
+          </p:nvPr>
+        </p:nvSpPr>
+        <p:spPr/>
+        <p:txBody>
+          <a:bodyPr/>
+          <a:lstStyle/>
           <a:p>
             <a:pPr lvl="0" indent="0" marL="0">
-              <a:spcBef>
-                <a:spcPts val="3000"/>
-              </a:spcBef>
               <a:buNone/>
             </a:pPr>
             <a:r>
-              <a:rPr b="1"/>
-              <a:t>snapshot-based versioning</a:t>
-            </a:r>
-          </a:p>
+              <a:rPr/>
+              <a:t>git is a command-line, snapshot-based versioning tool - created by Linux Torvalds to manage massive open source projects. i.e. the Linux kernel - used widely across the globe, for personal and enterprise use</a:t>
+            </a:r>
+          </a:p>
+        </p:txBody>
+      </p:sp>
+    </p:spTree>
+  </p:cSld>
+</p:sld>
+</file>
+
+<file path=ppt/slides/slide6.xml><?xml version="1.0" encoding="utf-8"?>
+<p:sld xmlns:a="http://schemas.openxmlformats.org/drawingml/2006/main" xmlns:r="http://schemas.openxmlformats.org/officeDocument/2006/relationships" xmlns:p="http://schemas.openxmlformats.org/presentationml/2006/main">
+  <p:cSld>
+    <p:spTree>
+      <p:nvGrpSpPr>
+        <p:cNvPr id="1" name=""/>
+        <p:cNvGrpSpPr/>
+        <p:nvPr/>
+      </p:nvGrpSpPr>
+      <p:grpSpPr>
+        <a:xfrm>
+          <a:off x="0" y="0"/>
+          <a:ext cx="0" cy="0"/>
+          <a:chOff x="0" y="0"/>
+          <a:chExt cx="0" cy="0"/>
+        </a:xfrm>
+      </p:grpSpPr>
+      <p:sp>
+        <p:nvSpPr>
+          <p:cNvPr id="2" name="Title 1"/>
+          <p:cNvSpPr>
+            <a:spLocks noGrp="1"/>
+          </p:cNvSpPr>
+          <p:nvPr>
+            <p:ph type="title"/>
+          </p:nvPr>
+        </p:nvSpPr>
+        <p:spPr>
+          <a:xfrm>
+            <a:off x="722313" y="3305176"/>
+            <a:ext cx="7772400" cy="1021556"/>
+          </a:xfrm>
+        </p:spPr>
+        <p:txBody>
+          <a:bodyPr/>
+          <a:lstStyle/>
           <a:p>
             <a:pPr lvl="0" indent="0" marL="0">
-              <a:spcBef>
-                <a:spcPts val="3000"/>
-              </a:spcBef>
               <a:buNone/>
             </a:pPr>
             <a:r>
-              <a:rPr b="1"/>
-              <a:t>Real Definition</a:t>
-            </a:r>
-          </a:p>
-          <a:p>
-            <a:pPr lvl="1" indent="0" marL="342900">
+              <a:rPr/>
+              <a:t>How do we use it</a:t>
+            </a:r>
+          </a:p>
+        </p:txBody>
+      </p:sp>
+    </p:spTree>
+  </p:cSld>
+</p:sld>
+</file>
+
+<file path=ppt/slides/slide7.xml><?xml version="1.0" encoding="utf-8"?>
+<p:sld xmlns:a="http://schemas.openxmlformats.org/drawingml/2006/main" xmlns:r="http://schemas.openxmlformats.org/officeDocument/2006/relationships" xmlns:p="http://schemas.openxmlformats.org/presentationml/2006/main">
+  <p:cSld>
+    <p:spTree>
+      <p:nvGrpSpPr>
+        <p:cNvPr id="1" name=""/>
+        <p:cNvGrpSpPr/>
+        <p:nvPr/>
+      </p:nvGrpSpPr>
+      <p:grpSpPr>
+        <a:xfrm>
+          <a:off x="0" y="0"/>
+          <a:ext cx="0" cy="0"/>
+          <a:chOff x="0" y="0"/>
+          <a:chExt cx="0" cy="0"/>
+        </a:xfrm>
+      </p:grpSpPr>
+      <p:sp>
+        <p:nvSpPr>
+          <p:cNvPr id="2" name="Title 1"/>
+          <p:cNvSpPr>
+            <a:spLocks noGrp="1"/>
+          </p:cNvSpPr>
+          <p:nvPr>
+            <p:ph type="title"/>
+          </p:nvPr>
+        </p:nvSpPr>
+        <p:spPr/>
+        <p:txBody>
+          <a:bodyPr/>
+          <a:lstStyle/>
+          <a:p>
+            <a:pPr lvl="0" indent="0" marL="0">
               <a:buNone/>
             </a:pPr>
             <a:r>
               <a:rPr/>
-              <a:t>git is a command-line, snapshot-based versioning tool</a:t>
-            </a:r>
-          </a:p>
-          <a:p>
-            <a:pPr lvl="0"/>
-            <a:r>
-              <a:rPr/>
-              <a:t>created by Linux Torvalds to manage massive open source projects. i.e. the Linux kernel</a:t>
-            </a:r>
-          </a:p>
-          <a:p>
-            <a:pPr lvl="0" indent="0" marL="0">
-              <a:spcBef>
-                <a:spcPts val="3000"/>
-              </a:spcBef>
-              <a:buNone/>
-            </a:pPr>
-            <a:r>
-              <a:rPr b="1"/>
-              <a:t>used widely across the globe, for personal and enterprise use</a:t>
-            </a:r>
-          </a:p>
-          <a:p>
-            <a:pPr lvl="0" indent="0" marL="0">
-              <a:spcBef>
-                <a:spcPts val="3000"/>
-              </a:spcBef>
-              <a:buNone/>
-            </a:pPr>
-            <a:r>
-              <a:rPr b="1"/>
-              <a:t># How do we use it</a:t>
-            </a:r>
-          </a:p>
-          <a:p>
-            <a:pPr lvl="0" indent="0" marL="0">
-              <a:spcBef>
-                <a:spcPts val="3000"/>
-              </a:spcBef>
-              <a:buNone/>
-            </a:pPr>
-            <a:r>
-              <a:rPr b="1"/>
               <a:t>Cloning a Repo</a:t>
             </a:r>
           </a:p>
-          <a:p>
-            <a:pPr lvl="0" indent="0" marL="0">
-              <a:spcBef>
-                <a:spcPts val="3000"/>
-              </a:spcBef>
-              <a:buNone/>
-            </a:pPr>
-            <a:r>
-              <a:rPr b="1">
+        </p:txBody>
+      </p:sp>
+      <p:sp>
+        <p:nvSpPr>
+          <p:cNvPr id="3" name="Content Placeholder 2"/>
+          <p:cNvSpPr>
+            <a:spLocks noGrp="1"/>
+          </p:cNvSpPr>
+          <p:nvPr>
+            <p:ph idx="1"/>
+          </p:nvPr>
+        </p:nvSpPr>
+        <p:spPr/>
+        <p:txBody>
+          <a:bodyPr/>
+          <a:lstStyle/>
+          <a:p>
+            <a:pPr lvl="0"/>
+            <a:r>
+              <a:rPr/>
+              <a:t>$</a:t>
+            </a:r>
+            <a:r>
+              <a:rPr>
                 <a:latin typeface="Courier"/>
               </a:rPr>
               <a:t>git clone &lt;repo&gt;.git</a:t>
             </a:r>
           </a:p>
+        </p:txBody>
+      </p:sp>
+    </p:spTree>
+  </p:cSld>
+</p:sld>
+</file>
+
+<file path=ppt/slides/slide8.xml><?xml version="1.0" encoding="utf-8"?>
+<p:sld xmlns:a="http://schemas.openxmlformats.org/drawingml/2006/main" xmlns:r="http://schemas.openxmlformats.org/officeDocument/2006/relationships" xmlns:p="http://schemas.openxmlformats.org/presentationml/2006/main">
+  <p:cSld>
+    <p:spTree>
+      <p:nvGrpSpPr>
+        <p:cNvPr id="1" name=""/>
+        <p:cNvGrpSpPr/>
+        <p:nvPr/>
+      </p:nvGrpSpPr>
+      <p:grpSpPr>
+        <a:xfrm>
+          <a:off x="0" y="0"/>
+          <a:ext cx="0" cy="0"/>
+          <a:chOff x="0" y="0"/>
+          <a:chExt cx="0" cy="0"/>
+        </a:xfrm>
+      </p:grpSpPr>
+      <p:sp>
+        <p:nvSpPr>
+          <p:cNvPr id="2" name="Title 1"/>
+          <p:cNvSpPr>
+            <a:spLocks noGrp="1"/>
+          </p:cNvSpPr>
+          <p:nvPr>
+            <p:ph type="title"/>
+          </p:nvPr>
+        </p:nvSpPr>
+        <p:spPr>
+          <a:xfrm>
+            <a:off x="722313" y="3305176"/>
+            <a:ext cx="7772400" cy="1021556"/>
+          </a:xfrm>
+        </p:spPr>
+        <p:txBody>
+          <a:bodyPr/>
+          <a:lstStyle/>
           <a:p>
             <a:pPr lvl="0" indent="0" marL="0">
-              <a:spcBef>
-                <a:spcPts val="3000"/>
-              </a:spcBef>
               <a:buNone/>
             </a:pPr>
             <a:r>
-              <a:rPr b="1"/>
+              <a:rPr/>
               <a:t>Creating a Repo</a:t>
             </a:r>
           </a:p>
+        </p:txBody>
+      </p:sp>
+    </p:spTree>
+  </p:cSld>
+</p:sld>
+</file>
+
+<file path=ppt/slides/slide9.xml><?xml version="1.0" encoding="utf-8"?>
+<p:sld xmlns:a="http://schemas.openxmlformats.org/drawingml/2006/main" xmlns:r="http://schemas.openxmlformats.org/officeDocument/2006/relationships" xmlns:p="http://schemas.openxmlformats.org/presentationml/2006/main">
+  <p:cSld>
+    <p:spTree>
+      <p:nvGrpSpPr>
+        <p:cNvPr id="1" name=""/>
+        <p:cNvGrpSpPr/>
+        <p:nvPr/>
+      </p:nvGrpSpPr>
+      <p:grpSpPr>
+        <a:xfrm>
+          <a:off x="0" y="0"/>
+          <a:ext cx="0" cy="0"/>
+          <a:chOff x="0" y="0"/>
+          <a:chExt cx="0" cy="0"/>
+        </a:xfrm>
+      </p:grpSpPr>
+      <p:sp>
+        <p:nvSpPr>
+          <p:cNvPr id="2" name="Title 1"/>
+          <p:cNvSpPr>
+            <a:spLocks noGrp="1"/>
+          </p:cNvSpPr>
+          <p:nvPr>
+            <p:ph type="title"/>
+          </p:nvPr>
+        </p:nvSpPr>
+        <p:spPr/>
+        <p:txBody>
+          <a:bodyPr/>
+          <a:lstStyle/>
           <a:p>
             <a:pPr lvl="0" indent="0" marL="0">
-              <a:spcBef>
-                <a:spcPts val="3000"/>
-              </a:spcBef>
               <a:buNone/>
             </a:pPr>
             <a:r>
-              <a:rPr b="1"/>
+              <a:rPr/>
               <a:t>Local</a:t>
             </a:r>
           </a:p>
-          <a:p>
-            <a:pPr lvl="1" indent="0" marL="342900">
+        </p:txBody>
+      </p:sp>
+      <p:sp>
+        <p:nvSpPr>
+          <p:cNvPr id="3" name="Content Placeholder 2"/>
+          <p:cNvSpPr>
+            <a:spLocks noGrp="1"/>
+          </p:cNvSpPr>
+          <p:nvPr>
+            <p:ph idx="1"/>
+          </p:nvPr>
+        </p:nvSpPr>
+        <p:spPr/>
+        <p:txBody>
+          <a:bodyPr/>
+          <a:lstStyle/>
+          <a:p>
+            <a:pPr lvl="0" indent="0" marL="0">
               <a:buNone/>
             </a:pPr>
             <a:r>
               <a:rPr/>
-              <a:t>first create a local Repo</a:t>
-            </a:r>
-          </a:p>
-          <a:p>
-            <a:pPr lvl="0"/>
+              <a:t>first create a local Repo - </a:t>
+            </a:r>
             <a:r>
               <a:rPr>
                 <a:latin typeface="Courier"/>
               </a:rPr>
               <a:t>cd /path/to/project/dir</a:t>
             </a:r>
-          </a:p>
-          <a:p>
-            <a:pPr lvl="0"/>
+            <a:r>
+              <a:rPr/>
+              <a:t> - </a:t>
+            </a:r>
             <a:r>
               <a:rPr>
                 <a:latin typeface="Courier"/>
               </a:rPr>
               <a:t>git init -b &lt;branch-name&gt;</a:t>
             </a:r>
-          </a:p>
-          <a:p>
-            <a:pPr lvl="0"/>
-            <a:r>
-              <a:rPr/>
-              <a:t>add any files you don’t want to be kept track of to </a:t>
+            <a:r>
+              <a:rPr/>
+              <a:t> - add any files you don’t want to be kept track of to </a:t>
             </a:r>
             <a:r>
               <a:rPr>
@@ -3389,600 +4975,25 @@
               </a:rPr>
               <a:t>.gitignore</a:t>
             </a:r>
-          </a:p>
-          <a:p>
-            <a:pPr lvl="0"/>
+            <a:r>
+              <a:rPr/>
+              <a:t> - </a:t>
+            </a:r>
             <a:r>
               <a:rPr>
                 <a:latin typeface="Courier"/>
               </a:rPr>
               <a:t>git stage .</a:t>
             </a:r>
-          </a:p>
-          <a:p>
-            <a:pPr lvl="0" indent="0" marL="0">
-              <a:spcBef>
-                <a:spcPts val="3000"/>
-              </a:spcBef>
-              <a:buNone/>
-            </a:pPr>
-            <a:r>
-              <a:rPr b="1">
+            <a:r>
+              <a:rPr/>
+              <a:t> - </a:t>
+            </a:r>
+            <a:r>
+              <a:rPr>
                 <a:latin typeface="Courier"/>
               </a:rPr>
               <a:t>git commit</a:t>
-            </a:r>
-          </a:p>
-          <a:p>
-            <a:pPr lvl="0" indent="0" marL="0">
-              <a:spcBef>
-                <a:spcPts val="3000"/>
-              </a:spcBef>
-              <a:buNone/>
-            </a:pPr>
-            <a:r>
-              <a:rPr b="1"/>
-              <a:t>Remote</a:t>
-            </a:r>
-          </a:p>
-          <a:p>
-            <a:pPr lvl="1" indent="0" marL="342900">
-              <a:buNone/>
-            </a:pPr>
-            <a:r>
-              <a:rPr/>
-              <a:t>now push your Repo to a remote</a:t>
-            </a:r>
-          </a:p>
-          <a:p>
-            <a:pPr lvl="0"/>
-            <a:r>
-              <a:rPr/>
-              <a:t>Create a Repo on your desired remote(GitHub)</a:t>
-            </a:r>
-          </a:p>
-          <a:p>
-            <a:pPr lvl="0"/>
-            <a:r>
-              <a:rPr>
-                <a:latin typeface="Courier"/>
-              </a:rPr>
-              <a:t>git add remote origin &lt;remote repo&gt;.git</a:t>
-            </a:r>
-          </a:p>
-          <a:p>
-            <a:pPr lvl="0" indent="0" marL="0">
-              <a:spcBef>
-                <a:spcPts val="3000"/>
-              </a:spcBef>
-              <a:buNone/>
-            </a:pPr>
-            <a:r>
-              <a:rPr b="1"/>
-              <a:t>now to sync your local repo with the remote repo do: </a:t>
-            </a:r>
-            <a:r>
-              <a:rPr b="1">
-                <a:latin typeface="Courier"/>
-              </a:rPr>
-              <a:t>git pull &amp;&amp; git push</a:t>
-            </a:r>
-          </a:p>
-          <a:p>
-            <a:pPr lvl="0" indent="0" marL="0">
-              <a:spcBef>
-                <a:spcPts val="3000"/>
-              </a:spcBef>
-              <a:buNone/>
-            </a:pPr>
-            <a:r>
-              <a:rPr b="1"/>
-              <a:t>Commits</a:t>
-            </a:r>
-          </a:p>
-          <a:p>
-            <a:pPr lvl="0"/>
-            <a:r>
-              <a:rPr/>
-              <a:t>the backbone of git</a:t>
-            </a:r>
-          </a:p>
-          <a:p>
-            <a:pPr lvl="0"/>
-            <a:r>
-              <a:rPr/>
-              <a:t>creates a snapshot in time of your project and hashes it for computation</a:t>
-            </a:r>
-          </a:p>
-          <a:p>
-            <a:pPr lvl="0" indent="0" marL="0">
-              <a:spcBef>
-                <a:spcPts val="3000"/>
-              </a:spcBef>
-              <a:buNone/>
-            </a:pPr>
-            <a:r>
-              <a:rPr b="1"/>
-              <a:t>after any meaningful change, you should ‘commit’ your changes</a:t>
-            </a:r>
-          </a:p>
-          <a:p>
-            <a:pPr lvl="0" indent="0" marL="0">
-              <a:spcBef>
-                <a:spcPts val="3000"/>
-              </a:spcBef>
-              <a:buNone/>
-            </a:pPr>
-            <a:r>
-              <a:rPr b="1"/>
-              <a:t>Branches/Merges</a:t>
-            </a:r>
-          </a:p>
-          <a:p>
-            <a:pPr lvl="0"/>
-            <a:r>
-              <a:rPr/>
-              <a:t>many people working on a project</a:t>
-            </a:r>
-          </a:p>
-          <a:p>
-            <a:pPr lvl="0"/>
-            <a:r>
-              <a:rPr/>
-              <a:t>issues arise when everybody has their hands on a single file</a:t>
-            </a:r>
-          </a:p>
-          <a:p>
-            <a:pPr lvl="0"/>
-            <a:r>
-              <a:rPr/>
-              <a:t>changes more than a few lines of code should be done in branches</a:t>
-            </a:r>
-          </a:p>
-          <a:p>
-            <a:pPr lvl="0"/>
-            <a:r>
-              <a:rPr/>
-              <a:t>as simple as </a:t>
-            </a:r>
-            <a:r>
-              <a:rPr>
-                <a:latin typeface="Courier"/>
-              </a:rPr>
-              <a:t>git switch -c &lt;branch-name&gt;</a:t>
-            </a:r>
-          </a:p>
-          <a:p>
-            <a:pPr lvl="0"/>
-            <a:r>
-              <a:rPr/>
-              <a:t>make your changes</a:t>
-            </a:r>
-          </a:p>
-          <a:p>
-            <a:pPr lvl="0" indent="0" marL="0">
-              <a:spcBef>
-                <a:spcPts val="3000"/>
-              </a:spcBef>
-              <a:buNone/>
-            </a:pPr>
-            <a:r>
-              <a:rPr b="1"/>
-              <a:t>when your ready, merge your changes into the main branch with </a:t>
-            </a:r>
-            <a:r>
-              <a:rPr b="1">
-                <a:latin typeface="Courier"/>
-              </a:rPr>
-              <a:t>git switch main &amp;&amp; git merge &lt;branch-name&gt;</a:t>
-            </a:r>
-          </a:p>
-          <a:p>
-            <a:pPr lvl="0" indent="0" marL="0">
-              <a:spcBef>
-                <a:spcPts val="3000"/>
-              </a:spcBef>
-              <a:buNone/>
-            </a:pPr>
-            <a:r>
-              <a:rPr b="1"/>
-              <a:t>Fork/PR</a:t>
-            </a:r>
-          </a:p>
-          <a:p>
-            <a:pPr lvl="0"/>
-            <a:r>
-              <a:rPr/>
-              <a:t>not everybody can edit your repo</a:t>
-            </a:r>
-          </a:p>
-          <a:p>
-            <a:pPr lvl="0"/>
-            <a:r>
-              <a:rPr/>
-              <a:t>anybody can copy it</a:t>
-            </a:r>
-          </a:p>
-          <a:p>
-            <a:pPr lvl="0"/>
-            <a:r>
-              <a:rPr/>
-              <a:t>pull requests are the official way to ask a project maintainer to pull your changes into their project. usually they’ll review your changes and either accept the pull, offer suggestions you should change before they pull, or deny it altogether.</a:t>
-            </a:r>
-          </a:p>
-          <a:p>
-            <a:pPr lvl="0"/>
-            <a:r>
-              <a:rPr/>
-              <a:t>to contribute to someone else’s project there are a few steps:</a:t>
-            </a:r>
-          </a:p>
-          <a:p>
-            <a:pPr lvl="1"/>
-            <a:r>
-              <a:rPr/>
-              <a:t>‘fork’ the repo: usually a ‘fork’ button at the top of a repo’s page</a:t>
-            </a:r>
-          </a:p>
-          <a:p>
-            <a:pPr lvl="1"/>
-            <a:r>
-              <a:rPr/>
-              <a:t>run </a:t>
-            </a:r>
-            <a:r>
-              <a:rPr>
-                <a:latin typeface="Courier"/>
-              </a:rPr>
-              <a:t>git clone &lt;forked-repo&gt;</a:t>
-            </a:r>
-          </a:p>
-          <a:p>
-            <a:pPr lvl="1"/>
-            <a:r>
-              <a:rPr/>
-              <a:t>make your changes &amp; </a:t>
-            </a:r>
-            <a:r>
-              <a:rPr>
-                <a:latin typeface="Courier"/>
-              </a:rPr>
-              <a:t>git commit &amp;&amp; git push</a:t>
-            </a:r>
-          </a:p>
-          <a:p>
-            <a:pPr lvl="0" indent="0" marL="0">
-              <a:spcBef>
-                <a:spcPts val="3000"/>
-              </a:spcBef>
-              <a:buNone/>
-            </a:pPr>
-            <a:r>
-              <a:rPr b="1"/>
-              <a:t>submit a ‘pull request’</a:t>
-            </a:r>
-          </a:p>
-          <a:p>
-            <a:pPr lvl="0" indent="0" marL="0">
-              <a:spcBef>
-                <a:spcPts val="3000"/>
-              </a:spcBef>
-              <a:buNone/>
-            </a:pPr>
-            <a:r>
-              <a:rPr b="1"/>
-              <a:t># Practical Examples</a:t>
-            </a:r>
-          </a:p>
-          <a:p>
-            <a:pPr lvl="0" indent="0" marL="0">
-              <a:spcBef>
-                <a:spcPts val="3000"/>
-              </a:spcBef>
-              <a:buNone/>
-            </a:pPr>
-            <a:r>
-              <a:rPr b="1"/>
-              <a:t>Stashing</a:t>
-            </a:r>
-          </a:p>
-          <a:p>
-            <a:pPr lvl="0"/>
-            <a:r>
-              <a:rPr/>
-              <a:t>we all make mistakes</a:t>
-            </a:r>
-          </a:p>
-          <a:p>
-            <a:pPr lvl="0"/>
-            <a:r>
-              <a:rPr/>
-              <a:t>what if we’ve made changes somewhere we don’t want to</a:t>
-            </a:r>
-          </a:p>
-          <a:p>
-            <a:pPr lvl="0"/>
-            <a:r>
-              <a:rPr/>
-              <a:t>just </a:t>
-            </a:r>
-            <a:r>
-              <a:rPr>
-                <a:latin typeface="Courier"/>
-              </a:rPr>
-              <a:t>git stash</a:t>
-            </a:r>
-          </a:p>
-          <a:p>
-            <a:pPr lvl="0"/>
-            <a:r>
-              <a:rPr/>
-              <a:t>this will tuck away your changes where you can retrieve them later and restore your active tree to it’s previous state</a:t>
-            </a:r>
-          </a:p>
-          <a:p>
-            <a:pPr lvl="0"/>
-            <a:r>
-              <a:rPr/>
-              <a:t>e.g. you made changes to the wrong branch</a:t>
-            </a:r>
-          </a:p>
-          <a:p>
-            <a:pPr lvl="1"/>
-            <a:r>
-              <a:rPr>
-                <a:latin typeface="Courier"/>
-              </a:rPr>
-              <a:t>git stash</a:t>
-            </a:r>
-          </a:p>
-          <a:p>
-            <a:pPr lvl="1"/>
-            <a:r>
-              <a:rPr>
-                <a:latin typeface="Courier"/>
-              </a:rPr>
-              <a:t>git switch &lt;correct-branch&gt;</a:t>
-            </a:r>
-          </a:p>
-          <a:p>
-            <a:pPr lvl="0" indent="0" marL="0">
-              <a:spcBef>
-                <a:spcPts val="3000"/>
-              </a:spcBef>
-              <a:buNone/>
-            </a:pPr>
-            <a:r>
-              <a:rPr b="1">
-                <a:latin typeface="Courier"/>
-              </a:rPr>
-              <a:t>git stash pop</a:t>
-            </a:r>
-          </a:p>
-          <a:p>
-            <a:pPr lvl="0" indent="0" marL="0">
-              <a:spcBef>
-                <a:spcPts val="3000"/>
-              </a:spcBef>
-              <a:buNone/>
-            </a:pPr>
-            <a:r>
-              <a:rPr b="1"/>
-              <a:t>## Collaboration</a:t>
-            </a:r>
-          </a:p>
-          <a:p>
-            <a:pPr lvl="0" indent="0" marL="0">
-              <a:spcBef>
-                <a:spcPts val="3000"/>
-              </a:spcBef>
-              <a:buNone/>
-            </a:pPr>
-            <a:r>
-              <a:rPr b="1"/>
-              <a:t>Oh crap</a:t>
-            </a:r>
-          </a:p>
-          <a:p>
-            <a:pPr lvl="0"/>
-            <a:r>
-              <a:rPr/>
-              <a:t>you deleted a file in your tree and your IDE doesn’t have it anywhere in it’s history</a:t>
-            </a:r>
-          </a:p>
-          <a:p>
-            <a:pPr lvl="0"/>
-            <a:r>
-              <a:rPr/>
-              <a:t>just </a:t>
-            </a:r>
-            <a:r>
-              <a:rPr>
-                <a:latin typeface="Courier"/>
-              </a:rPr>
-              <a:t>git checkout &lt;last-commit-with-file&gt; &lt;file&gt;</a:t>
-            </a:r>
-          </a:p>
-          <a:p>
-            <a:pPr lvl="0"/>
-            <a:r>
-              <a:rPr/>
-              <a:t>the file has returned to it’s last commit’ed state</a:t>
-            </a:r>
-          </a:p>
-          <a:p>
-            <a:pPr lvl="0" indent="0" marL="0">
-              <a:spcBef>
-                <a:spcPts val="3000"/>
-              </a:spcBef>
-              <a:buNone/>
-            </a:pPr>
-            <a:r>
-              <a:rPr b="1"/>
-              <a:t>this is why it’s important to commit after each meaningful change</a:t>
-            </a:r>
-          </a:p>
-          <a:p>
-            <a:pPr lvl="0" indent="0" marL="0">
-              <a:spcBef>
-                <a:spcPts val="3000"/>
-              </a:spcBef>
-              <a:buNone/>
-            </a:pPr>
-            <a:r>
-              <a:rPr b="1"/>
-              <a:t>Upstream Changes</a:t>
-            </a:r>
-          </a:p>
-          <a:p>
-            <a:pPr lvl="0"/>
-            <a:r>
-              <a:rPr/>
-              <a:t>your working on a fork of a project</a:t>
-            </a:r>
-          </a:p>
-          <a:p>
-            <a:pPr lvl="0"/>
-            <a:r>
-              <a:rPr/>
-              <a:t>the upstream project has made changes</a:t>
-            </a:r>
-          </a:p>
-          <a:p>
-            <a:pPr lvl="0"/>
-            <a:r>
-              <a:rPr/>
-              <a:t>you can’t submit a PR unless your fork includes those changes</a:t>
-            </a:r>
-          </a:p>
-          <a:p>
-            <a:pPr lvl="0"/>
-            <a:r>
-              <a:rPr/>
-              <a:t>the GitHub Web-UI provides a way to do this</a:t>
-            </a:r>
-          </a:p>
-          <a:p>
-            <a:pPr lvl="0"/>
-            <a:r>
-              <a:rPr/>
-              <a:t>there’s an easier way:</a:t>
-            </a:r>
-          </a:p>
-          <a:p>
-            <a:pPr lvl="0"/>
-            <a:r>
-              <a:rPr>
-                <a:latin typeface="Courier"/>
-              </a:rPr>
-              <a:t>git remote add &lt;upstream-url&gt;.git</a:t>
-            </a:r>
-          </a:p>
-          <a:p>
-            <a:pPr lvl="0"/>
-            <a:r>
-              <a:rPr>
-                <a:latin typeface="Courier"/>
-              </a:rPr>
-              <a:t>git fetch upstream</a:t>
-            </a:r>
-          </a:p>
-          <a:p>
-            <a:pPr lvl="0" indent="0" marL="0">
-              <a:spcBef>
-                <a:spcPts val="3000"/>
-              </a:spcBef>
-              <a:buNone/>
-            </a:pPr>
-            <a:r>
-              <a:rPr b="1">
-                <a:latin typeface="Courier"/>
-              </a:rPr>
-              <a:t>git rebase upstream</a:t>
-            </a:r>
-          </a:p>
-          <a:p>
-            <a:pPr lvl="0" indent="0" marL="0">
-              <a:spcBef>
-                <a:spcPts val="3000"/>
-              </a:spcBef>
-              <a:buNone/>
-            </a:pPr>
-            <a:r>
-              <a:rPr b="1"/>
-              <a:t>Tagged Commits</a:t>
-            </a:r>
-          </a:p>
-          <a:p>
-            <a:pPr lvl="0"/>
-            <a:r>
-              <a:rPr/>
-              <a:t>you’re working on a project that people regularly install and depend on</a:t>
-            </a:r>
-          </a:p>
-          <a:p>
-            <a:pPr lvl="0"/>
-            <a:r>
-              <a:rPr/>
-              <a:t>you want to keep your repository current with your changes, but these changes may not be stable</a:t>
-            </a:r>
-          </a:p>
-          <a:p>
-            <a:pPr lvl="0"/>
-            <a:r>
-              <a:rPr/>
-              <a:t>you could use a different branch, but this isn’t very transparent to the users nor is it best practice</a:t>
-            </a:r>
-          </a:p>
-          <a:p>
-            <a:pPr lvl="0"/>
-            <a:r>
-              <a:rPr/>
-              <a:t>enter tagged commits</a:t>
-            </a:r>
-          </a:p>
-          <a:p>
-            <a:pPr lvl="0"/>
-            <a:r>
-              <a:rPr/>
-              <a:t>any commit that you designate can be tagged.</a:t>
-            </a:r>
-          </a:p>
-          <a:p>
-            <a:pPr lvl="0"/>
-            <a:r>
-              <a:rPr/>
-              <a:t>this is useful for showing your users which commit to use e.g. “release version”</a:t>
-            </a:r>
-          </a:p>
-          <a:p>
-            <a:pPr lvl="0"/>
-            <a:r>
-              <a:rPr/>
-              <a:t>tags can be made at commit time with </a:t>
-            </a:r>
-            <a:r>
-              <a:rPr>
-                <a:latin typeface="Courier"/>
-              </a:rPr>
-              <a:t>git commmit -m "&lt;your-tag-here&gt;"</a:t>
-            </a:r>
-            <a:r>
-              <a:rPr/>
-              <a:t> or afterwards with </a:t>
-            </a:r>
-            <a:r>
-              <a:rPr>
-                <a:latin typeface="Courier"/>
-              </a:rPr>
-              <a:t>git tag -a "&lt;your-tag&gt;" &lt;commit-hash&gt;</a:t>
-            </a:r>
-          </a:p>
-          <a:p>
-            <a:pPr lvl="0"/>
-            <a:r>
-              <a:rPr/>
-              <a:t>now when your users setup your project, then can rest assured that the major version tagged commit “should” be stable</a:t>
             </a:r>
           </a:p>
         </p:txBody>

</xml_diff>

<commit_message>
vault backup: 2024-04-22 12:33:01
</commit_message>
<xml_diff>
--- a/git-pres.pptx
+++ b/git-pres.pptx
@@ -27,6 +27,7 @@
     <p:sldId id="275" r:id="rId21"/>
     <p:sldId id="276" r:id="rId22"/>
     <p:sldId id="277" r:id="rId23"/>
+    <p:sldId id="278" r:id="rId24"/>
   </p:sldIdLst>
   <p:sldSz cx="9144000" cy="5143500" type="screen16x9"/>
   <p:notesSz cx="6858000" cy="9144000"/>
@@ -4407,6 +4408,69 @@
               <a:t>enter tagged commits</a:t>
             </a:r>
           </a:p>
+        </p:txBody>
+      </p:sp>
+    </p:spTree>
+  </p:cSld>
+</p:sld>
+</file>
+
+<file path=ppt/slides/slide23.xml><?xml version="1.0" encoding="utf-8"?>
+<p:sld xmlns:a="http://schemas.openxmlformats.org/drawingml/2006/main" xmlns:r="http://schemas.openxmlformats.org/officeDocument/2006/relationships" xmlns:p="http://schemas.openxmlformats.org/presentationml/2006/main">
+  <p:cSld>
+    <p:spTree>
+      <p:nvGrpSpPr>
+        <p:cNvPr id="1" name=""/>
+        <p:cNvGrpSpPr/>
+        <p:nvPr/>
+      </p:nvGrpSpPr>
+      <p:grpSpPr>
+        <a:xfrm>
+          <a:off x="0" y="0"/>
+          <a:ext cx="0" cy="0"/>
+          <a:chOff x="0" y="0"/>
+          <a:chExt cx="0" cy="0"/>
+        </a:xfrm>
+      </p:grpSpPr>
+      <p:sp>
+        <p:nvSpPr>
+          <p:cNvPr id="2" name="Title 1"/>
+          <p:cNvSpPr>
+            <a:spLocks noGrp="1"/>
+          </p:cNvSpPr>
+          <p:nvPr>
+            <p:ph type="title"/>
+          </p:nvPr>
+        </p:nvSpPr>
+        <p:spPr/>
+        <p:txBody>
+          <a:bodyPr/>
+          <a:lstStyle/>
+          <a:p>
+            <a:pPr lvl="0" indent="0" marL="0">
+              <a:buNone/>
+            </a:pPr>
+            <a:r>
+              <a:rPr/>
+              <a:t>Tagged Commits cont.5</a:t>
+            </a:r>
+          </a:p>
+        </p:txBody>
+      </p:sp>
+      <p:sp>
+        <p:nvSpPr>
+          <p:cNvPr id="3" name="Content Placeholder 2"/>
+          <p:cNvSpPr>
+            <a:spLocks noGrp="1"/>
+          </p:cNvSpPr>
+          <p:nvPr>
+            <p:ph idx="1"/>
+          </p:nvPr>
+        </p:nvSpPr>
+        <p:spPr/>
+        <p:txBody>
+          <a:bodyPr/>
+          <a:lstStyle/>
           <a:p>
             <a:pPr lvl="0"/>
             <a:r>
@@ -4815,10 +4879,6 @@
           <a:lstStyle/>
           <a:p>
             <a:pPr lvl="0"/>
-            <a:r>
-              <a:rPr/>
-              <a:t>$</a:t>
-            </a:r>
             <a:r>
               <a:rPr>
                 <a:latin typeface="Courier"/>

</xml_diff>

<commit_message>
vault backup: 2024-04-22 13:48:21
</commit_message>
<xml_diff>
--- a/git-pres.pptx
+++ b/git-pres.pptx
@@ -28,6 +28,7 @@
     <p:sldId id="276" r:id="rId22"/>
     <p:sldId id="277" r:id="rId23"/>
     <p:sldId id="278" r:id="rId24"/>
+    <p:sldId id="279" r:id="rId25"/>
   </p:sldIdLst>
   <p:sldSz cx="9144000" cy="5143500" type="screen16x9"/>
   <p:notesSz cx="6858000" cy="9144000"/>
@@ -3241,7 +3242,7 @@
             </a:pPr>
             <a:r>
               <a:rPr/>
-              <a:t>Remote</a:t>
+              <a:t>Local</a:t>
             </a:r>
           </a:p>
         </p:txBody>
@@ -3266,23 +3267,53 @@
             </a:pPr>
             <a:r>
               <a:rPr/>
-              <a:t>now push your Repo to a remote - Create a Repo on your desired remote(GitHub) - </a:t>
+              <a:t>first create a local Repo - </a:t>
             </a:r>
             <a:r>
               <a:rPr>
                 <a:latin typeface="Courier"/>
               </a:rPr>
-              <a:t>git add remote origin &lt;remote repo&gt;.git</a:t>
-            </a:r>
-            <a:r>
-              <a:rPr/>
-              <a:t> - now to sync your local repo with the remote repo do: </a:t>
+              <a:t>cd /path/to/project/dir</a:t>
+            </a:r>
+            <a:r>
+              <a:rPr/>
+              <a:t> - </a:t>
             </a:r>
             <a:r>
               <a:rPr>
                 <a:latin typeface="Courier"/>
               </a:rPr>
-              <a:t>git pull &amp;&amp; git push</a:t>
+              <a:t>git init -b &lt;branch-name&gt;</a:t>
+            </a:r>
+            <a:r>
+              <a:rPr/>
+              <a:t> - add any files you don’t want to be kept track of to </a:t>
+            </a:r>
+            <a:r>
+              <a:rPr>
+                <a:latin typeface="Courier"/>
+              </a:rPr>
+              <a:t>.gitignore</a:t>
+            </a:r>
+            <a:r>
+              <a:rPr/>
+              <a:t> - </a:t>
+            </a:r>
+            <a:r>
+              <a:rPr>
+                <a:latin typeface="Courier"/>
+              </a:rPr>
+              <a:t>git stage .</a:t>
+            </a:r>
+            <a:r>
+              <a:rPr/>
+              <a:t> - </a:t>
+            </a:r>
+            <a:r>
+              <a:rPr>
+                <a:latin typeface="Courier"/>
+              </a:rPr>
+              <a:t>git commit</a:t>
             </a:r>
           </a:p>
         </p:txBody>
@@ -3329,7 +3360,7 @@
             </a:pPr>
             <a:r>
               <a:rPr/>
-              <a:t>Commits</a:t>
+              <a:t>Remote</a:t>
             </a:r>
           </a:p>
         </p:txBody>
@@ -3349,24 +3380,28 @@
           <a:bodyPr/>
           <a:lstStyle/>
           <a:p>
-            <a:pPr lvl="0"/>
-            <a:r>
-              <a:rPr/>
-              <a:t>the backbone of git</a:t>
-            </a:r>
-          </a:p>
-          <a:p>
-            <a:pPr lvl="0"/>
-            <a:r>
-              <a:rPr/>
-              <a:t>creates a snapshot in time of your project and hashes it for computation</a:t>
-            </a:r>
-          </a:p>
-          <a:p>
-            <a:pPr lvl="0"/>
-            <a:r>
-              <a:rPr b="1"/>
-              <a:t>after any meaningful change, you should ‘commit’ your changes</a:t>
+            <a:pPr lvl="0" indent="0" marL="0">
+              <a:buNone/>
+            </a:pPr>
+            <a:r>
+              <a:rPr/>
+              <a:t>now push your Repo to a remote - Create a Repo on your desired remote(GitHub) - </a:t>
+            </a:r>
+            <a:r>
+              <a:rPr>
+                <a:latin typeface="Courier"/>
+              </a:rPr>
+              <a:t>git add remote origin &lt;remote repo&gt;.git</a:t>
+            </a:r>
+            <a:r>
+              <a:rPr/>
+              <a:t> - now to sync your local repo with the remote repo do: </a:t>
+            </a:r>
+            <a:r>
+              <a:rPr>
+                <a:latin typeface="Courier"/>
+              </a:rPr>
+              <a:t>git pull &amp;&amp; git push</a:t>
             </a:r>
           </a:p>
         </p:txBody>
@@ -3413,7 +3448,7 @@
             </a:pPr>
             <a:r>
               <a:rPr/>
-              <a:t>Branches</a:t>
+              <a:t>Commits</a:t>
             </a:r>
           </a:p>
         </p:txBody>
@@ -3436,41 +3471,21 @@
             <a:pPr lvl="0"/>
             <a:r>
               <a:rPr/>
-              <a:t>many people working on a project</a:t>
+              <a:t>the backbone of git</a:t>
             </a:r>
           </a:p>
           <a:p>
             <a:pPr lvl="0"/>
             <a:r>
               <a:rPr/>
-              <a:t>issues arise when everybody has their hands on a single file</a:t>
+              <a:t>creates a snapshot in time of your project and hashes it for computation</a:t>
             </a:r>
           </a:p>
           <a:p>
             <a:pPr lvl="0"/>
             <a:r>
-              <a:rPr/>
-              <a:t>changes more than a few lines of code should be done in branches</a:t>
-            </a:r>
-          </a:p>
-          <a:p>
-            <a:pPr lvl="0"/>
-            <a:r>
-              <a:rPr/>
-              <a:t>as simple as </a:t>
-            </a:r>
-            <a:r>
-              <a:rPr>
-                <a:latin typeface="Courier"/>
-              </a:rPr>
-              <a:t>git switch -c &lt;branch-name&gt;</a:t>
-            </a:r>
-          </a:p>
-          <a:p>
-            <a:pPr lvl="0"/>
-            <a:r>
-              <a:rPr/>
-              <a:t>make your changes</a:t>
+              <a:rPr b="1"/>
+              <a:t>after any meaningful change, you should ‘commit’ your changes</a:t>
             </a:r>
           </a:p>
         </p:txBody>
@@ -3517,7 +3532,7 @@
             </a:pPr>
             <a:r>
               <a:rPr/>
-              <a:t>Merges</a:t>
+              <a:t>Branches</a:t>
             </a:r>
           </a:p>
         </p:txBody>
@@ -3540,20 +3555,41 @@
             <a:pPr lvl="0"/>
             <a:r>
               <a:rPr/>
-              <a:t>when your ready, merge your changes into the main branch with </a:t>
+              <a:t>many people working on a project</a:t>
+            </a:r>
+          </a:p>
+          <a:p>
+            <a:pPr lvl="0"/>
+            <a:r>
+              <a:rPr/>
+              <a:t>issues arise when everybody has their hands on a single file</a:t>
+            </a:r>
+          </a:p>
+          <a:p>
+            <a:pPr lvl="0"/>
+            <a:r>
+              <a:rPr/>
+              <a:t>changes more than a few lines of code should be done in branches</a:t>
+            </a:r>
+          </a:p>
+          <a:p>
+            <a:pPr lvl="0"/>
+            <a:r>
+              <a:rPr/>
+              <a:t>as simple as </a:t>
             </a:r>
             <a:r>
               <a:rPr>
                 <a:latin typeface="Courier"/>
               </a:rPr>
-              <a:t>git switch main &amp;&amp; git merge &lt;branch-name&gt;</a:t>
+              <a:t>git switch -c &lt;branch-name&gt;</a:t>
             </a:r>
           </a:p>
           <a:p>
             <a:pPr lvl="0"/>
             <a:r>
               <a:rPr/>
-              <a:t>all changes to the branch will be reflected in main</a:t>
+              <a:t>make your changes</a:t>
             </a:r>
           </a:p>
         </p:txBody>
@@ -3600,7 +3636,7 @@
             </a:pPr>
             <a:r>
               <a:rPr/>
-              <a:t>Fork/PR</a:t>
+              <a:t>Merges</a:t>
             </a:r>
           </a:p>
         </p:txBody>
@@ -3623,21 +3659,20 @@
             <a:pPr lvl="0"/>
             <a:r>
               <a:rPr/>
-              <a:t>not everybody can edit your repo</a:t>
+              <a:t>when your ready, merge your changes into the main branch with </a:t>
+            </a:r>
+            <a:r>
+              <a:rPr>
+                <a:latin typeface="Courier"/>
+              </a:rPr>
+              <a:t>git switch main &amp;&amp; git merge &lt;branch-name&gt;</a:t>
             </a:r>
           </a:p>
           <a:p>
             <a:pPr lvl="0"/>
             <a:r>
               <a:rPr/>
-              <a:t>anybody can copy it</a:t>
-            </a:r>
-          </a:p>
-          <a:p>
-            <a:pPr lvl="0"/>
-            <a:r>
-              <a:rPr/>
-              <a:t>pull requests are the official way to ask a project maintainer to pull your changes into their project. usually they’ll review your changes and either accept the pull, offer suggestions you should change before they pull, or deny it altogether.</a:t>
+              <a:t>all changes to the branch will be reflected in main</a:t>
             </a:r>
           </a:p>
         </p:txBody>
@@ -3684,7 +3719,7 @@
             </a:pPr>
             <a:r>
               <a:rPr/>
-              <a:t>Fork cont.</a:t>
+              <a:t>Fork/PR</a:t>
             </a:r>
           </a:p>
         </p:txBody>
@@ -3707,47 +3742,21 @@
             <a:pPr lvl="0"/>
             <a:r>
               <a:rPr/>
-              <a:t>to contribute to someone else’s project there are a few steps:</a:t>
-            </a:r>
-          </a:p>
-          <a:p>
-            <a:pPr lvl="1"/>
-            <a:r>
-              <a:rPr/>
-              <a:t>‘fork’ the repo: usually a ‘fork’ button at the top of a repo’s page</a:t>
-            </a:r>
-          </a:p>
-          <a:p>
-            <a:pPr lvl="1"/>
-            <a:r>
-              <a:rPr/>
-              <a:t>run </a:t>
-            </a:r>
-            <a:r>
-              <a:rPr>
-                <a:latin typeface="Courier"/>
-              </a:rPr>
-              <a:t>git clone &lt;forked-repo&gt;</a:t>
-            </a:r>
-          </a:p>
-          <a:p>
-            <a:pPr lvl="1"/>
-            <a:r>
-              <a:rPr/>
-              <a:t>make your changes &amp; </a:t>
-            </a:r>
-            <a:r>
-              <a:rPr>
-                <a:latin typeface="Courier"/>
-              </a:rPr>
-              <a:t>git commit &amp;&amp; git push</a:t>
-            </a:r>
-          </a:p>
-          <a:p>
-            <a:pPr lvl="1"/>
-            <a:r>
-              <a:rPr/>
-              <a:t>submit a ‘pull request’</a:t>
+              <a:t>not everybody can edit your repo</a:t>
+            </a:r>
+          </a:p>
+          <a:p>
+            <a:pPr lvl="0"/>
+            <a:r>
+              <a:rPr/>
+              <a:t>anybody can copy it</a:t>
+            </a:r>
+          </a:p>
+          <a:p>
+            <a:pPr lvl="0"/>
+            <a:r>
+              <a:rPr/>
+              <a:t>pull requests are the official way to ask a project maintainer to pull your changes into their project. usually they’ll review your changes and either accept the pull, offer suggestions you should change before they pull, or deny it altogether.</a:t>
             </a:r>
           </a:p>
         </p:txBody>
@@ -3784,12 +3793,7 @@
             <p:ph type="title"/>
           </p:nvPr>
         </p:nvSpPr>
-        <p:spPr>
-          <a:xfrm>
-            <a:off x="722313" y="3305176"/>
-            <a:ext cx="7772400" cy="1021556"/>
-          </a:xfrm>
-        </p:spPr>
+        <p:spPr/>
         <p:txBody>
           <a:bodyPr/>
           <a:lstStyle/>
@@ -3799,7 +3803,70 @@
             </a:pPr>
             <a:r>
               <a:rPr/>
-              <a:t>Practical Examples</a:t>
+              <a:t>Fork cont.</a:t>
+            </a:r>
+          </a:p>
+        </p:txBody>
+      </p:sp>
+      <p:sp>
+        <p:nvSpPr>
+          <p:cNvPr id="3" name="Content Placeholder 2"/>
+          <p:cNvSpPr>
+            <a:spLocks noGrp="1"/>
+          </p:cNvSpPr>
+          <p:nvPr>
+            <p:ph idx="1"/>
+          </p:nvPr>
+        </p:nvSpPr>
+        <p:spPr/>
+        <p:txBody>
+          <a:bodyPr/>
+          <a:lstStyle/>
+          <a:p>
+            <a:pPr lvl="0"/>
+            <a:r>
+              <a:rPr/>
+              <a:t>to contribute to someone else’s project there are a few steps:</a:t>
+            </a:r>
+          </a:p>
+          <a:p>
+            <a:pPr lvl="1"/>
+            <a:r>
+              <a:rPr/>
+              <a:t>‘fork’ the repo: usually a ‘fork’ button at the top of a repo’s page</a:t>
+            </a:r>
+          </a:p>
+          <a:p>
+            <a:pPr lvl="1"/>
+            <a:r>
+              <a:rPr/>
+              <a:t>run </a:t>
+            </a:r>
+            <a:r>
+              <a:rPr>
+                <a:latin typeface="Courier"/>
+              </a:rPr>
+              <a:t>git clone &lt;forked-repo&gt;</a:t>
+            </a:r>
+          </a:p>
+          <a:p>
+            <a:pPr lvl="1"/>
+            <a:r>
+              <a:rPr/>
+              <a:t>make your changes &amp; </a:t>
+            </a:r>
+            <a:r>
+              <a:rPr>
+                <a:latin typeface="Courier"/>
+              </a:rPr>
+              <a:t>git commit &amp;&amp; git push</a:t>
+            </a:r>
+          </a:p>
+          <a:p>
+            <a:pPr lvl="1"/>
+            <a:r>
+              <a:rPr/>
+              <a:t>submit a ‘pull request’</a:t>
             </a:r>
           </a:p>
         </p:txBody>
@@ -3836,7 +3903,12 @@
             <p:ph type="title"/>
           </p:nvPr>
         </p:nvSpPr>
-        <p:spPr/>
+        <p:spPr>
+          <a:xfrm>
+            <a:off x="722313" y="3305176"/>
+            <a:ext cx="7772400" cy="1021556"/>
+          </a:xfrm>
+        </p:spPr>
         <p:txBody>
           <a:bodyPr/>
           <a:lstStyle/>
@@ -3846,50 +3918,7 @@
             </a:pPr>
             <a:r>
               <a:rPr/>
-              <a:t>Stashing</a:t>
-            </a:r>
-          </a:p>
-        </p:txBody>
-      </p:sp>
-      <p:sp>
-        <p:nvSpPr>
-          <p:cNvPr id="3" name="Content Placeholder 2"/>
-          <p:cNvSpPr>
-            <a:spLocks noGrp="1"/>
-          </p:cNvSpPr>
-          <p:nvPr>
-            <p:ph idx="1"/>
-          </p:nvPr>
-        </p:nvSpPr>
-        <p:spPr/>
-        <p:txBody>
-          <a:bodyPr/>
-          <a:lstStyle/>
-          <a:p>
-            <a:pPr lvl="0"/>
-            <a:r>
-              <a:rPr/>
-              <a:t>we all make mistakes</a:t>
-            </a:r>
-          </a:p>
-          <a:p>
-            <a:pPr lvl="0"/>
-            <a:r>
-              <a:rPr/>
-              <a:t>what if we’ve made changes somewhere we don’t want to</a:t>
-            </a:r>
-          </a:p>
-          <a:p>
-            <a:pPr lvl="0"/>
-            <a:r>
-              <a:rPr/>
-              <a:t>just </a:t>
-            </a:r>
-            <a:r>
-              <a:rPr>
-                <a:latin typeface="Courier"/>
-              </a:rPr>
-              <a:t>git stash</a:t>
+              <a:t>Practical Examples</a:t>
             </a:r>
           </a:p>
         </p:txBody>
@@ -3936,7 +3965,7 @@
             </a:pPr>
             <a:r>
               <a:rPr/>
-              <a:t>Stashing cont.</a:t>
+              <a:t>Stashing</a:t>
             </a:r>
           </a:p>
         </p:txBody>
@@ -3959,41 +3988,27 @@
             <a:pPr lvl="0"/>
             <a:r>
               <a:rPr/>
-              <a:t>this will tuck away your changes where you can retrieve them later and restore your active tree to it’s previous state</a:t>
+              <a:t>we all make mistakes</a:t>
             </a:r>
           </a:p>
           <a:p>
             <a:pPr lvl="0"/>
             <a:r>
               <a:rPr/>
-              <a:t>e.g. you made changes to the wrong branch</a:t>
-            </a:r>
-          </a:p>
-          <a:p>
-            <a:pPr lvl="1"/>
+              <a:t>what if we’ve made changes somewhere we don’t want to</a:t>
+            </a:r>
+          </a:p>
+          <a:p>
+            <a:pPr lvl="0"/>
+            <a:r>
+              <a:rPr/>
+              <a:t>just </a:t>
+            </a:r>
             <a:r>
               <a:rPr>
                 <a:latin typeface="Courier"/>
               </a:rPr>
               <a:t>git stash</a:t>
-            </a:r>
-          </a:p>
-          <a:p>
-            <a:pPr lvl="1"/>
-            <a:r>
-              <a:rPr>
-                <a:latin typeface="Courier"/>
-              </a:rPr>
-              <a:t>git switch &lt;correct-branch&gt;</a:t>
-            </a:r>
-          </a:p>
-          <a:p>
-            <a:pPr lvl="1"/>
-            <a:r>
-              <a:rPr>
-                <a:latin typeface="Courier"/>
-              </a:rPr>
-              <a:t>git stash pop</a:t>
             </a:r>
           </a:p>
         </p:txBody>
@@ -4040,7 +4055,64 @@
             </a:pPr>
             <a:r>
               <a:rPr/>
-              <a:t>Collaboration</a:t>
+              <a:t>Stashing cont.</a:t>
+            </a:r>
+          </a:p>
+        </p:txBody>
+      </p:sp>
+      <p:sp>
+        <p:nvSpPr>
+          <p:cNvPr id="3" name="Content Placeholder 2"/>
+          <p:cNvSpPr>
+            <a:spLocks noGrp="1"/>
+          </p:cNvSpPr>
+          <p:nvPr>
+            <p:ph idx="1"/>
+          </p:nvPr>
+        </p:nvSpPr>
+        <p:spPr/>
+        <p:txBody>
+          <a:bodyPr/>
+          <a:lstStyle/>
+          <a:p>
+            <a:pPr lvl="0"/>
+            <a:r>
+              <a:rPr/>
+              <a:t>this will tuck away your changes where you can retrieve them later and restore your active tree to it’s previous state</a:t>
+            </a:r>
+          </a:p>
+          <a:p>
+            <a:pPr lvl="0"/>
+            <a:r>
+              <a:rPr/>
+              <a:t>e.g. you made changes to the wrong branch</a:t>
+            </a:r>
+          </a:p>
+          <a:p>
+            <a:pPr lvl="1"/>
+            <a:r>
+              <a:rPr>
+                <a:latin typeface="Courier"/>
+              </a:rPr>
+              <a:t>git stash</a:t>
+            </a:r>
+          </a:p>
+          <a:p>
+            <a:pPr lvl="1"/>
+            <a:r>
+              <a:rPr>
+                <a:latin typeface="Courier"/>
+              </a:rPr>
+              <a:t>git switch &lt;correct-branch&gt;</a:t>
+            </a:r>
+          </a:p>
+          <a:p>
+            <a:pPr lvl="1"/>
+            <a:r>
+              <a:rPr>
+                <a:latin typeface="Courier"/>
+              </a:rPr>
+              <a:t>git stash pop</a:t>
             </a:r>
           </a:p>
         </p:txBody>
@@ -4139,57 +4211,7 @@
             </a:pPr>
             <a:r>
               <a:rPr/>
-              <a:t>Oh crap</a:t>
-            </a:r>
-          </a:p>
-        </p:txBody>
-      </p:sp>
-      <p:sp>
-        <p:nvSpPr>
-          <p:cNvPr id="3" name="Content Placeholder 2"/>
-          <p:cNvSpPr>
-            <a:spLocks noGrp="1"/>
-          </p:cNvSpPr>
-          <p:nvPr>
-            <p:ph idx="1"/>
-          </p:nvPr>
-        </p:nvSpPr>
-        <p:spPr/>
-        <p:txBody>
-          <a:bodyPr/>
-          <a:lstStyle/>
-          <a:p>
-            <a:pPr lvl="0"/>
-            <a:r>
-              <a:rPr/>
-              <a:t>you deleted a file in your tree and your IDE doesn’t have it anywhere in it’s history</a:t>
-            </a:r>
-          </a:p>
-          <a:p>
-            <a:pPr lvl="0"/>
-            <a:r>
-              <a:rPr/>
-              <a:t>just </a:t>
-            </a:r>
-            <a:r>
-              <a:rPr>
-                <a:latin typeface="Courier"/>
-              </a:rPr>
-              <a:t>git checkout &lt;last-commit-with-file&gt; &lt;file&gt;</a:t>
-            </a:r>
-          </a:p>
-          <a:p>
-            <a:pPr lvl="0"/>
-            <a:r>
-              <a:rPr/>
-              <a:t>the file has returned to it’s last commit’ed state</a:t>
-            </a:r>
-          </a:p>
-          <a:p>
-            <a:pPr lvl="0"/>
-            <a:r>
-              <a:rPr/>
-              <a:t>this is why it’s important to commit after each meaningful change</a:t>
+              <a:t>Collaboration</a:t>
             </a:r>
           </a:p>
         </p:txBody>
@@ -4236,7 +4258,7 @@
             </a:pPr>
             <a:r>
               <a:rPr/>
-              <a:t>Upstream Changes</a:t>
+              <a:t>Oh crap</a:t>
             </a:r>
           </a:p>
         </p:txBody>
@@ -4259,62 +4281,34 @@
             <a:pPr lvl="0"/>
             <a:r>
               <a:rPr/>
-              <a:t>your working on a fork of a project</a:t>
+              <a:t>you deleted a file in your tree and your IDE doesn’t have it anywhere in it’s history</a:t>
             </a:r>
           </a:p>
           <a:p>
             <a:pPr lvl="0"/>
             <a:r>
               <a:rPr/>
-              <a:t>the upstream project has made changes</a:t>
-            </a:r>
-          </a:p>
-          <a:p>
-            <a:pPr lvl="0"/>
-            <a:r>
-              <a:rPr/>
-              <a:t>you can’t submit a PR unless your fork includes those changes</a:t>
-            </a:r>
-          </a:p>
-          <a:p>
-            <a:pPr lvl="0"/>
-            <a:r>
-              <a:rPr/>
-              <a:t>the GitHub Web-UI provides a way to do this</a:t>
-            </a:r>
-          </a:p>
-          <a:p>
-            <a:pPr lvl="0"/>
-            <a:r>
-              <a:rPr/>
-              <a:t>there’s an easier way:</a:t>
-            </a:r>
-          </a:p>
-          <a:p>
-            <a:pPr lvl="0"/>
+              <a:t>just </a:t>
+            </a:r>
             <a:r>
               <a:rPr>
                 <a:latin typeface="Courier"/>
               </a:rPr>
-              <a:t>git remote add &lt;upstream-url&gt;.git</a:t>
+              <a:t>git checkout &lt;last-commit-with-file&gt; &lt;file&gt;</a:t>
             </a:r>
           </a:p>
           <a:p>
             <a:pPr lvl="0"/>
             <a:r>
-              <a:rPr>
-                <a:latin typeface="Courier"/>
-              </a:rPr>
-              <a:t>git fetch upstream</a:t>
+              <a:rPr/>
+              <a:t>the file has returned to it’s last commit’ed state</a:t>
             </a:r>
           </a:p>
           <a:p>
             <a:pPr lvl="0"/>
             <a:r>
-              <a:rPr>
-                <a:latin typeface="Courier"/>
-              </a:rPr>
-              <a:t>git rebase upstream</a:t>
+              <a:rPr/>
+              <a:t>this is why it’s important to commit after each meaningful change</a:t>
             </a:r>
           </a:p>
         </p:txBody>
@@ -4361,7 +4355,7 @@
             </a:pPr>
             <a:r>
               <a:rPr/>
-              <a:t>Tagged Commits</a:t>
+              <a:t>Upstream Changes</a:t>
             </a:r>
           </a:p>
         </p:txBody>
@@ -4384,28 +4378,62 @@
             <a:pPr lvl="0"/>
             <a:r>
               <a:rPr/>
-              <a:t>you’re working on a project that people regularly install and depend on</a:t>
+              <a:t>your working on a fork of a project</a:t>
             </a:r>
           </a:p>
           <a:p>
             <a:pPr lvl="0"/>
             <a:r>
               <a:rPr/>
-              <a:t>you want to keep your repository current with your changes, but these changes may not be stable</a:t>
+              <a:t>the upstream project has made changes</a:t>
             </a:r>
           </a:p>
           <a:p>
             <a:pPr lvl="0"/>
             <a:r>
               <a:rPr/>
-              <a:t>you could use a different branch, but this isn’t very transparent to the users nor is it best practice</a:t>
+              <a:t>you can’t submit a PR unless your fork includes those changes</a:t>
             </a:r>
           </a:p>
           <a:p>
             <a:pPr lvl="0"/>
             <a:r>
               <a:rPr/>
-              <a:t>enter tagged commits</a:t>
+              <a:t>the GitHub Web-UI provides a way to do this</a:t>
+            </a:r>
+          </a:p>
+          <a:p>
+            <a:pPr lvl="0"/>
+            <a:r>
+              <a:rPr/>
+              <a:t>there’s an easier way:</a:t>
+            </a:r>
+          </a:p>
+          <a:p>
+            <a:pPr lvl="0"/>
+            <a:r>
+              <a:rPr>
+                <a:latin typeface="Courier"/>
+              </a:rPr>
+              <a:t>git remote add &lt;upstream-url&gt;.git</a:t>
+            </a:r>
+          </a:p>
+          <a:p>
+            <a:pPr lvl="0"/>
+            <a:r>
+              <a:rPr>
+                <a:latin typeface="Courier"/>
+              </a:rPr>
+              <a:t>git fetch upstream</a:t>
+            </a:r>
+          </a:p>
+          <a:p>
+            <a:pPr lvl="0"/>
+            <a:r>
+              <a:rPr>
+                <a:latin typeface="Courier"/>
+              </a:rPr>
+              <a:t>git rebase upstream</a:t>
             </a:r>
           </a:p>
         </p:txBody>
@@ -4452,6 +4480,97 @@
             </a:pPr>
             <a:r>
               <a:rPr/>
+              <a:t>Tagged Commits</a:t>
+            </a:r>
+          </a:p>
+        </p:txBody>
+      </p:sp>
+      <p:sp>
+        <p:nvSpPr>
+          <p:cNvPr id="3" name="Content Placeholder 2"/>
+          <p:cNvSpPr>
+            <a:spLocks noGrp="1"/>
+          </p:cNvSpPr>
+          <p:nvPr>
+            <p:ph idx="1"/>
+          </p:nvPr>
+        </p:nvSpPr>
+        <p:spPr/>
+        <p:txBody>
+          <a:bodyPr/>
+          <a:lstStyle/>
+          <a:p>
+            <a:pPr lvl="0"/>
+            <a:r>
+              <a:rPr/>
+              <a:t>you’re working on a project that people regularly install and depend on</a:t>
+            </a:r>
+          </a:p>
+          <a:p>
+            <a:pPr lvl="0"/>
+            <a:r>
+              <a:rPr/>
+              <a:t>you want to keep your repository current with your changes, but these changes may not be stable</a:t>
+            </a:r>
+          </a:p>
+          <a:p>
+            <a:pPr lvl="0"/>
+            <a:r>
+              <a:rPr/>
+              <a:t>you could use a different branch, but this isn’t very transparent to the users nor is it best practice</a:t>
+            </a:r>
+          </a:p>
+          <a:p>
+            <a:pPr lvl="0"/>
+            <a:r>
+              <a:rPr/>
+              <a:t>enter tagged commits</a:t>
+            </a:r>
+          </a:p>
+        </p:txBody>
+      </p:sp>
+    </p:spTree>
+  </p:cSld>
+</p:sld>
+</file>
+
+<file path=ppt/slides/slide24.xml><?xml version="1.0" encoding="utf-8"?>
+<p:sld xmlns:a="http://schemas.openxmlformats.org/drawingml/2006/main" xmlns:r="http://schemas.openxmlformats.org/officeDocument/2006/relationships" xmlns:p="http://schemas.openxmlformats.org/presentationml/2006/main">
+  <p:cSld>
+    <p:spTree>
+      <p:nvGrpSpPr>
+        <p:cNvPr id="1" name=""/>
+        <p:cNvGrpSpPr/>
+        <p:nvPr/>
+      </p:nvGrpSpPr>
+      <p:grpSpPr>
+        <a:xfrm>
+          <a:off x="0" y="0"/>
+          <a:ext cx="0" cy="0"/>
+          <a:chOff x="0" y="0"/>
+          <a:chExt cx="0" cy="0"/>
+        </a:xfrm>
+      </p:grpSpPr>
+      <p:sp>
+        <p:nvSpPr>
+          <p:cNvPr id="2" name="Title 1"/>
+          <p:cNvSpPr>
+            <a:spLocks noGrp="1"/>
+          </p:cNvSpPr>
+          <p:nvPr>
+            <p:ph type="title"/>
+          </p:nvPr>
+        </p:nvSpPr>
+        <p:spPr/>
+        <p:txBody>
+          <a:bodyPr/>
+          <a:lstStyle/>
+          <a:p>
+            <a:pPr lvl="0" indent="0" marL="0">
+              <a:buNone/>
+            </a:pPr>
+            <a:r>
+              <a:rPr/>
               <a:t>Tagged Commits cont.5</a:t>
             </a:r>
           </a:p>
@@ -4643,7 +4762,7 @@
             </a:pPr>
             <a:r>
               <a:rPr/>
-              <a:t>The problem Git solves/ What is versioning</a:t>
+              <a:t>The Problem</a:t>
             </a:r>
           </a:p>
         </p:txBody>
@@ -4663,31 +4782,12 @@
           <a:bodyPr/>
           <a:lstStyle/>
           <a:p>
-            <a:pPr lvl="0"/>
-            <a:r>
-              <a:rPr/>
-              <a:t>scenario of versioning headaches</a:t>
-            </a:r>
-          </a:p>
-          <a:p>
-            <a:pPr lvl="0"/>
-            <a:r>
-              <a:rPr/>
-              <a:t>Hook: what if it was easier</a:t>
-            </a:r>
-          </a:p>
-          <a:p>
-            <a:pPr lvl="0"/>
-            <a:r>
-              <a:rPr/>
-              <a:t>change-based versioning</a:t>
-            </a:r>
-          </a:p>
-          <a:p>
-            <a:pPr lvl="0"/>
-            <a:r>
-              <a:rPr/>
-              <a:t>snapshot-based versioning</a:t>
+            <a:pPr lvl="0" indent="0" marL="0">
+              <a:buNone/>
+            </a:pPr>
+            <a:r>
+              <a:rPr/>
+              <a:t>Imagine you’re working on a group project with two others. You’re all editing a document together. One person, Alice, decides to rewrite a big section without telling the others. Later, when everyone combines their work, chaos erupts because Alice’s changes clash with the rest. If they had a system to work on their parts separately, like having their own drafts, it would avoid the mess.</a:t>
             </a:r>
           </a:p>
         </p:txBody>
@@ -4734,7 +4834,7 @@
             </a:pPr>
             <a:r>
               <a:rPr/>
-              <a:t>Real Definition</a:t>
+              <a:t>Solution</a:t>
             </a:r>
           </a:p>
         </p:txBody>
@@ -4754,12 +4854,137 @@
           <a:bodyPr/>
           <a:lstStyle/>
           <a:p>
-            <a:pPr lvl="0" indent="0" marL="0">
+            <a:pPr lvl="0"/>
+            <a:r>
+              <a:rPr/>
+              <a:t>Change-based versioning (not git)</a:t>
+            </a:r>
+          </a:p>
+          <a:p>
+            <a:pPr lvl="0"/>
+            <a:r>
+              <a:rPr/>
+              <a:t>snapshot-based versioning (git)</a:t>
+            </a:r>
+          </a:p>
+        </p:txBody>
+      </p:sp>
+      <p:pic>
+        <p:nvPicPr>
+          <p:cNvPr descr="deltas.png" id="0" name="Picture 1"/>
+          <p:cNvPicPr>
+            <a:picLocks noGrp="1" noChangeAspect="1"/>
+          </p:cNvPicPr>
+          <p:nvPr/>
+        </p:nvPicPr>
+        <p:blipFill>
+          <a:blip r:embed="rId2"/>
+          <a:stretch>
+            <a:fillRect/>
+          </a:stretch>
+        </p:blipFill>
+        <p:spPr bwMode="auto">
+          <a:xfrm>
+            <a:off x="850900" y="1193800"/>
+            <a:ext cx="7442200" cy="2882900"/>
+          </a:xfrm>
+          <a:prstGeom prst="rect">
+            <a:avLst/>
+          </a:prstGeom>
+          <a:noFill/>
+          <a:ln w="9525">
+            <a:noFill/>
+            <a:headEnd/>
+            <a:tailEnd/>
+          </a:ln>
+        </p:spPr>
+      </p:pic>
+      <p:sp>
+        <p:nvSpPr>
+          <p:cNvPr id="1" name="TextBox 3"/>
+          <p:cNvSpPr txBox="1"/>
+          <p:nvPr/>
+        </p:nvSpPr>
+        <p:spPr>
+          <a:xfrm>
+            <a:off x="457200" y="4076700"/>
+            <a:ext cx="8229600" cy="508000"/>
+          </a:xfrm>
+          <a:prstGeom prst="rect">
+            <a:avLst/>
+          </a:prstGeom>
+          <a:noFill/>
+        </p:spPr>
+        <p:txBody>
+          <a:bodyPr/>
+          <a:lstStyle/>
+          <a:p>
+            <a:pPr lvl="0" indent="0" marL="0" algn="ctr">
               <a:buNone/>
             </a:pPr>
             <a:r>
               <a:rPr/>
-              <a:t>git is a command-line, snapshot-based versioning tool - created by Linux Torvalds to manage massive open source projects. i.e. the Linux kernel - used widely across the globe, for personal and enterprise use</a:t>
+              <a:t>image</a:t>
+            </a:r>
+          </a:p>
+        </p:txBody>
+      </p:sp>
+      <p:pic>
+        <p:nvPicPr>
+          <p:cNvPr descr="snapshots.png" id="0" name="Picture 1"/>
+          <p:cNvPicPr>
+            <a:picLocks noGrp="1" noChangeAspect="1"/>
+          </p:cNvPicPr>
+          <p:nvPr/>
+        </p:nvPicPr>
+        <p:blipFill>
+          <a:blip r:embed="rId3"/>
+          <a:stretch>
+            <a:fillRect/>
+          </a:stretch>
+        </p:blipFill>
+        <p:spPr bwMode="auto">
+          <a:xfrm>
+            <a:off x="787400" y="1193800"/>
+            <a:ext cx="7556500" cy="2882900"/>
+          </a:xfrm>
+          <a:prstGeom prst="rect">
+            <a:avLst/>
+          </a:prstGeom>
+          <a:noFill/>
+          <a:ln w="9525">
+            <a:noFill/>
+            <a:headEnd/>
+            <a:tailEnd/>
+          </a:ln>
+        </p:spPr>
+      </p:pic>
+      <p:sp>
+        <p:nvSpPr>
+          <p:cNvPr id="1" name="TextBox 3"/>
+          <p:cNvSpPr txBox="1"/>
+          <p:nvPr/>
+        </p:nvSpPr>
+        <p:spPr>
+          <a:xfrm>
+            <a:off x="457200" y="4076700"/>
+            <a:ext cx="8229600" cy="508000"/>
+          </a:xfrm>
+          <a:prstGeom prst="rect">
+            <a:avLst/>
+          </a:prstGeom>
+          <a:noFill/>
+        </p:spPr>
+        <p:txBody>
+          <a:bodyPr/>
+          <a:lstStyle/>
+          <a:p>
+            <a:pPr lvl="0" indent="0" marL="0" algn="ctr">
+              <a:buNone/>
+            </a:pPr>
+            <a:r>
+              <a:rPr/>
+              <a:t>image</a:t>
             </a:r>
           </a:p>
         </p:txBody>
@@ -4796,12 +5021,7 @@
             <p:ph type="title"/>
           </p:nvPr>
         </p:nvSpPr>
-        <p:spPr>
-          <a:xfrm>
-            <a:off x="722313" y="3305176"/>
-            <a:ext cx="7772400" cy="1021556"/>
-          </a:xfrm>
-        </p:spPr>
+        <p:spPr/>
         <p:txBody>
           <a:bodyPr/>
           <a:lstStyle/>
@@ -4811,7 +5031,32 @@
             </a:pPr>
             <a:r>
               <a:rPr/>
-              <a:t>How do we use it</a:t>
+              <a:t>Real Definition</a:t>
+            </a:r>
+          </a:p>
+        </p:txBody>
+      </p:sp>
+      <p:sp>
+        <p:nvSpPr>
+          <p:cNvPr id="3" name="Content Placeholder 2"/>
+          <p:cNvSpPr>
+            <a:spLocks noGrp="1"/>
+          </p:cNvSpPr>
+          <p:nvPr>
+            <p:ph idx="1"/>
+          </p:nvPr>
+        </p:nvSpPr>
+        <p:spPr/>
+        <p:txBody>
+          <a:bodyPr/>
+          <a:lstStyle/>
+          <a:p>
+            <a:pPr lvl="0" indent="0" marL="0">
+              <a:buNone/>
+            </a:pPr>
+            <a:r>
+              <a:rPr/>
+              <a:t>git is a command-line, snapshot-based versioning tool - created by Linux Torvalds to manage massive open source projects. i.e. the Linux kernel - used widely across the globe, for personal and enterprise use</a:t>
             </a:r>
           </a:p>
         </p:txBody>
@@ -4848,7 +5093,12 @@
             <p:ph type="title"/>
           </p:nvPr>
         </p:nvSpPr>
-        <p:spPr/>
+        <p:spPr>
+          <a:xfrm>
+            <a:off x="722313" y="3305176"/>
+            <a:ext cx="7772400" cy="1021556"/>
+          </a:xfrm>
+        </p:spPr>
         <p:txBody>
           <a:bodyPr/>
           <a:lstStyle/>
@@ -4858,32 +5108,7 @@
             </a:pPr>
             <a:r>
               <a:rPr/>
-              <a:t>Cloning a Repo</a:t>
-            </a:r>
-          </a:p>
-        </p:txBody>
-      </p:sp>
-      <p:sp>
-        <p:nvSpPr>
-          <p:cNvPr id="3" name="Content Placeholder 2"/>
-          <p:cNvSpPr>
-            <a:spLocks noGrp="1"/>
-          </p:cNvSpPr>
-          <p:nvPr>
-            <p:ph idx="1"/>
-          </p:nvPr>
-        </p:nvSpPr>
-        <p:spPr/>
-        <p:txBody>
-          <a:bodyPr/>
-          <a:lstStyle/>
-          <a:p>
-            <a:pPr lvl="0"/>
-            <a:r>
-              <a:rPr>
-                <a:latin typeface="Courier"/>
-              </a:rPr>
-              <a:t>git clone &lt;repo&gt;.git</a:t>
+              <a:t>How do we use it</a:t>
             </a:r>
           </a:p>
         </p:txBody>
@@ -4920,12 +5145,7 @@
             <p:ph type="title"/>
           </p:nvPr>
         </p:nvSpPr>
-        <p:spPr>
-          <a:xfrm>
-            <a:off x="722313" y="3305176"/>
-            <a:ext cx="7772400" cy="1021556"/>
-          </a:xfrm>
-        </p:spPr>
+        <p:spPr/>
         <p:txBody>
           <a:bodyPr/>
           <a:lstStyle/>
@@ -4935,7 +5155,32 @@
             </a:pPr>
             <a:r>
               <a:rPr/>
-              <a:t>Creating a Repo</a:t>
+              <a:t>Cloning a Repo</a:t>
+            </a:r>
+          </a:p>
+        </p:txBody>
+      </p:sp>
+      <p:sp>
+        <p:nvSpPr>
+          <p:cNvPr id="3" name="Content Placeholder 2"/>
+          <p:cNvSpPr>
+            <a:spLocks noGrp="1"/>
+          </p:cNvSpPr>
+          <p:nvPr>
+            <p:ph idx="1"/>
+          </p:nvPr>
+        </p:nvSpPr>
+        <p:spPr/>
+        <p:txBody>
+          <a:bodyPr/>
+          <a:lstStyle/>
+          <a:p>
+            <a:pPr lvl="0"/>
+            <a:r>
+              <a:rPr>
+                <a:latin typeface="Courier"/>
+              </a:rPr>
+              <a:t>git clone &lt;repo&gt;.git</a:t>
             </a:r>
           </a:p>
         </p:txBody>
@@ -4972,7 +5217,12 @@
             <p:ph type="title"/>
           </p:nvPr>
         </p:nvSpPr>
-        <p:spPr/>
+        <p:spPr>
+          <a:xfrm>
+            <a:off x="722313" y="3305176"/>
+            <a:ext cx="7772400" cy="1021556"/>
+          </a:xfrm>
+        </p:spPr>
         <p:txBody>
           <a:bodyPr/>
           <a:lstStyle/>
@@ -4982,78 +5232,7 @@
             </a:pPr>
             <a:r>
               <a:rPr/>
-              <a:t>Local</a:t>
-            </a:r>
-          </a:p>
-        </p:txBody>
-      </p:sp>
-      <p:sp>
-        <p:nvSpPr>
-          <p:cNvPr id="3" name="Content Placeholder 2"/>
-          <p:cNvSpPr>
-            <a:spLocks noGrp="1"/>
-          </p:cNvSpPr>
-          <p:nvPr>
-            <p:ph idx="1"/>
-          </p:nvPr>
-        </p:nvSpPr>
-        <p:spPr/>
-        <p:txBody>
-          <a:bodyPr/>
-          <a:lstStyle/>
-          <a:p>
-            <a:pPr lvl="0" indent="0" marL="0">
-              <a:buNone/>
-            </a:pPr>
-            <a:r>
-              <a:rPr/>
-              <a:t>first create a local Repo - </a:t>
-            </a:r>
-            <a:r>
-              <a:rPr>
-                <a:latin typeface="Courier"/>
-              </a:rPr>
-              <a:t>cd /path/to/project/dir</a:t>
-            </a:r>
-            <a:r>
-              <a:rPr/>
-              <a:t> - </a:t>
-            </a:r>
-            <a:r>
-              <a:rPr>
-                <a:latin typeface="Courier"/>
-              </a:rPr>
-              <a:t>git init -b &lt;branch-name&gt;</a:t>
-            </a:r>
-            <a:r>
-              <a:rPr/>
-              <a:t> - add any files you don’t want to be kept track of to </a:t>
-            </a:r>
-            <a:r>
-              <a:rPr>
-                <a:latin typeface="Courier"/>
-              </a:rPr>
-              <a:t>.gitignore</a:t>
-            </a:r>
-            <a:r>
-              <a:rPr/>
-              <a:t> - </a:t>
-            </a:r>
-            <a:r>
-              <a:rPr>
-                <a:latin typeface="Courier"/>
-              </a:rPr>
-              <a:t>git stage .</a:t>
-            </a:r>
-            <a:r>
-              <a:rPr/>
-              <a:t> - </a:t>
-            </a:r>
-            <a:r>
-              <a:rPr>
-                <a:latin typeface="Courier"/>
-              </a:rPr>
-              <a:t>git commit</a:t>
+              <a:t>Creating a Repo</a:t>
             </a:r>
           </a:p>
         </p:txBody>

</xml_diff>